<commit_message>
docs: synced via GitHub Actions
</commit_message>
<xml_diff>
--- a/src/ppt/ref-images.pptx
+++ b/src/ppt/ref-images.pptx
@@ -15,6 +15,10 @@
     <p:sldId id="266" r:id="rId9"/>
     <p:sldId id="265" r:id="rId10"/>
     <p:sldId id="267" r:id="rId11"/>
+    <p:sldId id="268" r:id="rId12"/>
+    <p:sldId id="269" r:id="rId13"/>
+    <p:sldId id="270" r:id="rId14"/>
+    <p:sldId id="271" r:id="rId15"/>
   </p:sldIdLst>
   <p:sldSz cx="12192000" cy="6858000"/>
   <p:notesSz cx="6858000" cy="9144000"/>
@@ -123,7 +127,7 @@
 
 <file path=ppt/commentAuthors.xml><?xml version="1.0" encoding="utf-8"?>
 <p:cmAuthorLst xmlns:a="http://schemas.openxmlformats.org/drawingml/2006/main" xmlns:r="http://schemas.openxmlformats.org/officeDocument/2006/relationships" xmlns:p="http://schemas.openxmlformats.org/presentationml/2006/main">
-  <p:cmAuthor id="1" name="李 强" initials="李" lastIdx="4" clrIdx="0">
+  <p:cmAuthor id="1" name="李 强" initials="李" lastIdx="5" clrIdx="0">
     <p:extLst>
       <p:ext uri="{19B8F6BF-5375-455C-9EA6-DF929625EA0E}">
         <p15:presenceInfo xmlns:p15="http://schemas.microsoft.com/office/powerpoint/2012/main" userId="8ae047f2a68f3c06" providerId="Windows Live"/>
@@ -280,7 +284,7 @@
           <a:p>
             <a:fld id="{29653C36-4834-4792-85AF-FA0E38AFE74C}" type="datetimeFigureOut">
               <a:rPr lang="zh-CN" altLang="en-US" smtClean="0"/>
-              <a:t>2023/9/8</a:t>
+              <a:t>2024/8/28</a:t>
             </a:fld>
             <a:endParaRPr lang="zh-CN" altLang="en-US"/>
           </a:p>
@@ -478,7 +482,7 @@
           <a:p>
             <a:fld id="{29653C36-4834-4792-85AF-FA0E38AFE74C}" type="datetimeFigureOut">
               <a:rPr lang="zh-CN" altLang="en-US" smtClean="0"/>
-              <a:t>2023/9/8</a:t>
+              <a:t>2024/8/28</a:t>
             </a:fld>
             <a:endParaRPr lang="zh-CN" altLang="en-US"/>
           </a:p>
@@ -686,7 +690,7 @@
           <a:p>
             <a:fld id="{29653C36-4834-4792-85AF-FA0E38AFE74C}" type="datetimeFigureOut">
               <a:rPr lang="zh-CN" altLang="en-US" smtClean="0"/>
-              <a:t>2023/9/8</a:t>
+              <a:t>2024/8/28</a:t>
             </a:fld>
             <a:endParaRPr lang="zh-CN" altLang="en-US"/>
           </a:p>
@@ -884,7 +888,7 @@
           <a:p>
             <a:fld id="{29653C36-4834-4792-85AF-FA0E38AFE74C}" type="datetimeFigureOut">
               <a:rPr lang="zh-CN" altLang="en-US" smtClean="0"/>
-              <a:t>2023/9/8</a:t>
+              <a:t>2024/8/28</a:t>
             </a:fld>
             <a:endParaRPr lang="zh-CN" altLang="en-US"/>
           </a:p>
@@ -1159,7 +1163,7 @@
           <a:p>
             <a:fld id="{29653C36-4834-4792-85AF-FA0E38AFE74C}" type="datetimeFigureOut">
               <a:rPr lang="zh-CN" altLang="en-US" smtClean="0"/>
-              <a:t>2023/9/8</a:t>
+              <a:t>2024/8/28</a:t>
             </a:fld>
             <a:endParaRPr lang="zh-CN" altLang="en-US"/>
           </a:p>
@@ -1424,7 +1428,7 @@
           <a:p>
             <a:fld id="{29653C36-4834-4792-85AF-FA0E38AFE74C}" type="datetimeFigureOut">
               <a:rPr lang="zh-CN" altLang="en-US" smtClean="0"/>
-              <a:t>2023/9/8</a:t>
+              <a:t>2024/8/28</a:t>
             </a:fld>
             <a:endParaRPr lang="zh-CN" altLang="en-US"/>
           </a:p>
@@ -1836,7 +1840,7 @@
           <a:p>
             <a:fld id="{29653C36-4834-4792-85AF-FA0E38AFE74C}" type="datetimeFigureOut">
               <a:rPr lang="zh-CN" altLang="en-US" smtClean="0"/>
-              <a:t>2023/9/8</a:t>
+              <a:t>2024/8/28</a:t>
             </a:fld>
             <a:endParaRPr lang="zh-CN" altLang="en-US"/>
           </a:p>
@@ -1977,7 +1981,7 @@
           <a:p>
             <a:fld id="{29653C36-4834-4792-85AF-FA0E38AFE74C}" type="datetimeFigureOut">
               <a:rPr lang="zh-CN" altLang="en-US" smtClean="0"/>
-              <a:t>2023/9/8</a:t>
+              <a:t>2024/8/28</a:t>
             </a:fld>
             <a:endParaRPr lang="zh-CN" altLang="en-US"/>
           </a:p>
@@ -2090,7 +2094,7 @@
           <a:p>
             <a:fld id="{29653C36-4834-4792-85AF-FA0E38AFE74C}" type="datetimeFigureOut">
               <a:rPr lang="zh-CN" altLang="en-US" smtClean="0"/>
-              <a:t>2023/9/8</a:t>
+              <a:t>2024/8/28</a:t>
             </a:fld>
             <a:endParaRPr lang="zh-CN" altLang="en-US"/>
           </a:p>
@@ -2401,7 +2405,7 @@
           <a:p>
             <a:fld id="{29653C36-4834-4792-85AF-FA0E38AFE74C}" type="datetimeFigureOut">
               <a:rPr lang="zh-CN" altLang="en-US" smtClean="0"/>
-              <a:t>2023/9/8</a:t>
+              <a:t>2024/8/28</a:t>
             </a:fld>
             <a:endParaRPr lang="zh-CN" altLang="en-US"/>
           </a:p>
@@ -2689,7 +2693,7 @@
           <a:p>
             <a:fld id="{29653C36-4834-4792-85AF-FA0E38AFE74C}" type="datetimeFigureOut">
               <a:rPr lang="zh-CN" altLang="en-US" smtClean="0"/>
-              <a:t>2023/9/8</a:t>
+              <a:t>2024/8/28</a:t>
             </a:fld>
             <a:endParaRPr lang="zh-CN" altLang="en-US"/>
           </a:p>
@@ -2930,7 +2934,7 @@
           <a:p>
             <a:fld id="{29653C36-4834-4792-85AF-FA0E38AFE74C}" type="datetimeFigureOut">
               <a:rPr lang="zh-CN" altLang="en-US" smtClean="0"/>
-              <a:t>2023/9/8</a:t>
+              <a:t>2024/8/28</a:t>
             </a:fld>
             <a:endParaRPr lang="zh-CN" altLang="en-US"/>
           </a:p>
@@ -4710,6 +4714,2899 @@
 </p:sld>
 </file>
 
+<file path=ppt/slides/slide11.xml><?xml version="1.0" encoding="utf-8"?>
+<p:sld xmlns:a="http://schemas.openxmlformats.org/drawingml/2006/main" xmlns:r="http://schemas.openxmlformats.org/officeDocument/2006/relationships" xmlns:p="http://schemas.openxmlformats.org/presentationml/2006/main">
+  <p:cSld>
+    <p:spTree>
+      <p:nvGrpSpPr>
+        <p:cNvPr id="1" name=""/>
+        <p:cNvGrpSpPr/>
+        <p:nvPr/>
+      </p:nvGrpSpPr>
+      <p:grpSpPr>
+        <a:xfrm>
+          <a:off x="0" y="0"/>
+          <a:ext cx="0" cy="0"/>
+          <a:chOff x="0" y="0"/>
+          <a:chExt cx="0" cy="0"/>
+        </a:xfrm>
+      </p:grpSpPr>
+      <p:sp>
+        <p:nvSpPr>
+          <p:cNvPr id="7" name="矩形 6">
+            <a:extLst>
+              <a:ext uri="{FF2B5EF4-FFF2-40B4-BE49-F238E27FC236}">
+                <a16:creationId xmlns:a16="http://schemas.microsoft.com/office/drawing/2014/main" id="{112A52AE-07AA-4D47-3616-356AA7D1B6A2}"/>
+              </a:ext>
+            </a:extLst>
+          </p:cNvPr>
+          <p:cNvSpPr/>
+          <p:nvPr/>
+        </p:nvSpPr>
+        <p:spPr>
+          <a:xfrm>
+            <a:off x="2037980" y="2175692"/>
+            <a:ext cx="1932479" cy="567758"/>
+          </a:xfrm>
+          <a:prstGeom prst="rect">
+            <a:avLst/>
+          </a:prstGeom>
+          <a:gradFill>
+            <a:gsLst>
+              <a:gs pos="25000">
+                <a:schemeClr val="accent1">
+                  <a:satMod val="103000"/>
+                  <a:tint val="94000"/>
+                  <a:lumMod val="99000"/>
+                </a:schemeClr>
+              </a:gs>
+              <a:gs pos="50000">
+                <a:schemeClr val="accent1">
+                  <a:satMod val="110000"/>
+                  <a:lumMod val="100000"/>
+                  <a:shade val="100000"/>
+                </a:schemeClr>
+              </a:gs>
+              <a:gs pos="100000">
+                <a:schemeClr val="accent1">
+                  <a:lumMod val="99000"/>
+                  <a:satMod val="120000"/>
+                  <a:shade val="78000"/>
+                </a:schemeClr>
+              </a:gs>
+            </a:gsLst>
+          </a:gradFill>
+        </p:spPr>
+        <p:style>
+          <a:lnRef idx="1">
+            <a:schemeClr val="accent1"/>
+          </a:lnRef>
+          <a:fillRef idx="3">
+            <a:schemeClr val="accent1"/>
+          </a:fillRef>
+          <a:effectRef idx="2">
+            <a:schemeClr val="accent1"/>
+          </a:effectRef>
+          <a:fontRef idx="minor">
+            <a:schemeClr val="lt1"/>
+          </a:fontRef>
+        </p:style>
+        <p:txBody>
+          <a:bodyPr rtlCol="0" anchor="ctr"/>
+          <a:lstStyle/>
+          <a:p>
+            <a:pPr algn="ctr"/>
+            <a:r>
+              <a:rPr lang="en-US" altLang="zh-CN" dirty="0"/>
+              <a:t>Load Model</a:t>
+            </a:r>
+            <a:endParaRPr lang="zh-CN" altLang="en-US" dirty="0"/>
+          </a:p>
+        </p:txBody>
+      </p:sp>
+      <p:sp>
+        <p:nvSpPr>
+          <p:cNvPr id="2" name="矩形 1">
+            <a:extLst>
+              <a:ext uri="{FF2B5EF4-FFF2-40B4-BE49-F238E27FC236}">
+                <a16:creationId xmlns:a16="http://schemas.microsoft.com/office/drawing/2014/main" id="{738D59E6-C747-6672-F28D-59227801D1EA}"/>
+              </a:ext>
+            </a:extLst>
+          </p:cNvPr>
+          <p:cNvSpPr/>
+          <p:nvPr/>
+        </p:nvSpPr>
+        <p:spPr>
+          <a:xfrm>
+            <a:off x="4822820" y="2175692"/>
+            <a:ext cx="1932479" cy="567758"/>
+          </a:xfrm>
+          <a:prstGeom prst="rect">
+            <a:avLst/>
+          </a:prstGeom>
+        </p:spPr>
+        <p:style>
+          <a:lnRef idx="1">
+            <a:schemeClr val="accent1"/>
+          </a:lnRef>
+          <a:fillRef idx="3">
+            <a:schemeClr val="accent1"/>
+          </a:fillRef>
+          <a:effectRef idx="2">
+            <a:schemeClr val="accent1"/>
+          </a:effectRef>
+          <a:fontRef idx="minor">
+            <a:schemeClr val="lt1"/>
+          </a:fontRef>
+        </p:style>
+        <p:txBody>
+          <a:bodyPr rtlCol="0" anchor="ctr"/>
+          <a:lstStyle/>
+          <a:p>
+            <a:pPr algn="ctr"/>
+            <a:r>
+              <a:rPr lang="en-US" altLang="zh-CN" dirty="0"/>
+              <a:t>Run @init</a:t>
+            </a:r>
+            <a:endParaRPr lang="zh-CN" altLang="en-US" dirty="0"/>
+          </a:p>
+        </p:txBody>
+      </p:sp>
+      <p:sp>
+        <p:nvSpPr>
+          <p:cNvPr id="3" name="矩形 2">
+            <a:extLst>
+              <a:ext uri="{FF2B5EF4-FFF2-40B4-BE49-F238E27FC236}">
+                <a16:creationId xmlns:a16="http://schemas.microsoft.com/office/drawing/2014/main" id="{0FFD9622-6CD8-575D-12D8-2EE6633C94D3}"/>
+              </a:ext>
+            </a:extLst>
+          </p:cNvPr>
+          <p:cNvSpPr/>
+          <p:nvPr/>
+        </p:nvSpPr>
+        <p:spPr>
+          <a:xfrm>
+            <a:off x="7607661" y="2175692"/>
+            <a:ext cx="1932479" cy="567758"/>
+          </a:xfrm>
+          <a:prstGeom prst="rect">
+            <a:avLst/>
+          </a:prstGeom>
+        </p:spPr>
+        <p:style>
+          <a:lnRef idx="1">
+            <a:schemeClr val="accent1"/>
+          </a:lnRef>
+          <a:fillRef idx="3">
+            <a:schemeClr val="accent1"/>
+          </a:fillRef>
+          <a:effectRef idx="2">
+            <a:schemeClr val="accent1"/>
+          </a:effectRef>
+          <a:fontRef idx="minor">
+            <a:schemeClr val="lt1"/>
+          </a:fontRef>
+        </p:style>
+        <p:txBody>
+          <a:bodyPr rtlCol="0" anchor="ctr"/>
+          <a:lstStyle/>
+          <a:p>
+            <a:pPr algn="ctr"/>
+            <a:r>
+              <a:rPr lang="en-US" altLang="zh-CN" dirty="0"/>
+              <a:t>Run </a:t>
+            </a:r>
+            <a:r>
+              <a:rPr lang="en-US" altLang="zh-CN" dirty="0" err="1"/>
+              <a:t>xgen</a:t>
+            </a:r>
+            <a:endParaRPr lang="zh-CN" altLang="en-US" dirty="0"/>
+          </a:p>
+        </p:txBody>
+      </p:sp>
+      <p:cxnSp>
+        <p:nvCxnSpPr>
+          <p:cNvPr id="8" name="直接箭头连接符 7">
+            <a:extLst>
+              <a:ext uri="{FF2B5EF4-FFF2-40B4-BE49-F238E27FC236}">
+                <a16:creationId xmlns:a16="http://schemas.microsoft.com/office/drawing/2014/main" id="{97DC043A-6D74-0532-593E-973B6139B5C3}"/>
+              </a:ext>
+            </a:extLst>
+          </p:cNvPr>
+          <p:cNvCxnSpPr>
+            <a:stCxn id="7" idx="3"/>
+            <a:endCxn id="2" idx="1"/>
+          </p:cNvCxnSpPr>
+          <p:nvPr/>
+        </p:nvCxnSpPr>
+        <p:spPr>
+          <a:xfrm>
+            <a:off x="3970459" y="2459571"/>
+            <a:ext cx="852361" cy="0"/>
+          </a:xfrm>
+          <a:prstGeom prst="straightConnector1">
+            <a:avLst/>
+          </a:prstGeom>
+          <a:ln>
+            <a:tailEnd type="triangle"/>
+          </a:ln>
+        </p:spPr>
+        <p:style>
+          <a:lnRef idx="1">
+            <a:schemeClr val="accent1"/>
+          </a:lnRef>
+          <a:fillRef idx="0">
+            <a:schemeClr val="accent1"/>
+          </a:fillRef>
+          <a:effectRef idx="0">
+            <a:schemeClr val="accent1"/>
+          </a:effectRef>
+          <a:fontRef idx="minor">
+            <a:schemeClr val="tx1"/>
+          </a:fontRef>
+        </p:style>
+      </p:cxnSp>
+      <p:cxnSp>
+        <p:nvCxnSpPr>
+          <p:cNvPr id="10" name="直接箭头连接符 9">
+            <a:extLst>
+              <a:ext uri="{FF2B5EF4-FFF2-40B4-BE49-F238E27FC236}">
+                <a16:creationId xmlns:a16="http://schemas.microsoft.com/office/drawing/2014/main" id="{620CCB63-25D6-F87F-35D2-2A6516CDCF8E}"/>
+              </a:ext>
+            </a:extLst>
+          </p:cNvPr>
+          <p:cNvCxnSpPr>
+            <a:stCxn id="2" idx="3"/>
+            <a:endCxn id="3" idx="1"/>
+          </p:cNvCxnSpPr>
+          <p:nvPr/>
+        </p:nvCxnSpPr>
+        <p:spPr>
+          <a:xfrm>
+            <a:off x="6755299" y="2459571"/>
+            <a:ext cx="852362" cy="0"/>
+          </a:xfrm>
+          <a:prstGeom prst="straightConnector1">
+            <a:avLst/>
+          </a:prstGeom>
+          <a:ln>
+            <a:tailEnd type="triangle"/>
+          </a:ln>
+        </p:spPr>
+        <p:style>
+          <a:lnRef idx="1">
+            <a:schemeClr val="accent1"/>
+          </a:lnRef>
+          <a:fillRef idx="0">
+            <a:schemeClr val="accent1"/>
+          </a:fillRef>
+          <a:effectRef idx="0">
+            <a:schemeClr val="accent1"/>
+          </a:effectRef>
+          <a:fontRef idx="minor">
+            <a:schemeClr val="tx1"/>
+          </a:fontRef>
+        </p:style>
+      </p:cxnSp>
+      <p:sp>
+        <p:nvSpPr>
+          <p:cNvPr id="12" name="椭圆 11">
+            <a:extLst>
+              <a:ext uri="{FF2B5EF4-FFF2-40B4-BE49-F238E27FC236}">
+                <a16:creationId xmlns:a16="http://schemas.microsoft.com/office/drawing/2014/main" id="{59020946-6E8D-6B37-975E-BB19F5B367F4}"/>
+              </a:ext>
+            </a:extLst>
+          </p:cNvPr>
+          <p:cNvSpPr/>
+          <p:nvPr/>
+        </p:nvSpPr>
+        <p:spPr>
+          <a:xfrm>
+            <a:off x="2236626" y="3214779"/>
+            <a:ext cx="1535186" cy="755009"/>
+          </a:xfrm>
+          <a:prstGeom prst="ellipse">
+            <a:avLst/>
+          </a:prstGeom>
+        </p:spPr>
+        <p:style>
+          <a:lnRef idx="1">
+            <a:schemeClr val="accent2"/>
+          </a:lnRef>
+          <a:fillRef idx="2">
+            <a:schemeClr val="accent2"/>
+          </a:fillRef>
+          <a:effectRef idx="1">
+            <a:schemeClr val="accent2"/>
+          </a:effectRef>
+          <a:fontRef idx="minor">
+            <a:schemeClr val="dk1"/>
+          </a:fontRef>
+        </p:style>
+        <p:txBody>
+          <a:bodyPr rtlCol="0" anchor="ctr"/>
+          <a:lstStyle/>
+          <a:p>
+            <a:pPr algn="ctr"/>
+            <a:r>
+              <a:rPr lang="en-US" altLang="zh-CN" dirty="0"/>
+              <a:t>imp.xml</a:t>
+            </a:r>
+            <a:endParaRPr lang="zh-CN" altLang="en-US" dirty="0"/>
+          </a:p>
+        </p:txBody>
+      </p:sp>
+      <p:sp>
+        <p:nvSpPr>
+          <p:cNvPr id="13" name="椭圆 12">
+            <a:extLst>
+              <a:ext uri="{FF2B5EF4-FFF2-40B4-BE49-F238E27FC236}">
+                <a16:creationId xmlns:a16="http://schemas.microsoft.com/office/drawing/2014/main" id="{2E72F6C1-4032-2B55-06BF-9CF5F4D89C9D}"/>
+              </a:ext>
+            </a:extLst>
+          </p:cNvPr>
+          <p:cNvSpPr/>
+          <p:nvPr/>
+        </p:nvSpPr>
+        <p:spPr>
+          <a:xfrm>
+            <a:off x="2236626" y="1043178"/>
+            <a:ext cx="1535186" cy="755009"/>
+          </a:xfrm>
+          <a:prstGeom prst="ellipse">
+            <a:avLst/>
+          </a:prstGeom>
+        </p:spPr>
+        <p:style>
+          <a:lnRef idx="1">
+            <a:schemeClr val="accent2"/>
+          </a:lnRef>
+          <a:fillRef idx="2">
+            <a:schemeClr val="accent2"/>
+          </a:fillRef>
+          <a:effectRef idx="1">
+            <a:schemeClr val="accent2"/>
+          </a:effectRef>
+          <a:fontRef idx="minor">
+            <a:schemeClr val="dk1"/>
+          </a:fontRef>
+        </p:style>
+        <p:txBody>
+          <a:bodyPr rtlCol="0" anchor="ctr"/>
+          <a:lstStyle/>
+          <a:p>
+            <a:pPr algn="ctr"/>
+            <a:r>
+              <a:rPr lang="en-US" altLang="zh-CN" dirty="0"/>
+              <a:t>xpt.xml</a:t>
+            </a:r>
+            <a:endParaRPr lang="zh-CN" altLang="en-US" dirty="0"/>
+          </a:p>
+        </p:txBody>
+      </p:sp>
+      <p:cxnSp>
+        <p:nvCxnSpPr>
+          <p:cNvPr id="16" name="直接箭头连接符 15">
+            <a:extLst>
+              <a:ext uri="{FF2B5EF4-FFF2-40B4-BE49-F238E27FC236}">
+                <a16:creationId xmlns:a16="http://schemas.microsoft.com/office/drawing/2014/main" id="{B5633BE3-0223-A7FD-32A3-1DBE6B2CB9BC}"/>
+              </a:ext>
+            </a:extLst>
+          </p:cNvPr>
+          <p:cNvCxnSpPr>
+            <a:stCxn id="7" idx="2"/>
+          </p:cNvCxnSpPr>
+          <p:nvPr/>
+        </p:nvCxnSpPr>
+        <p:spPr>
+          <a:xfrm flipH="1">
+            <a:off x="3004219" y="2743450"/>
+            <a:ext cx="1" cy="471329"/>
+          </a:xfrm>
+          <a:prstGeom prst="straightConnector1">
+            <a:avLst/>
+          </a:prstGeom>
+          <a:ln>
+            <a:tailEnd type="triangle"/>
+          </a:ln>
+        </p:spPr>
+        <p:style>
+          <a:lnRef idx="1">
+            <a:schemeClr val="accent1"/>
+          </a:lnRef>
+          <a:fillRef idx="0">
+            <a:schemeClr val="accent1"/>
+          </a:fillRef>
+          <a:effectRef idx="0">
+            <a:schemeClr val="accent1"/>
+          </a:effectRef>
+          <a:fontRef idx="minor">
+            <a:schemeClr val="tx1"/>
+          </a:fontRef>
+        </p:style>
+      </p:cxnSp>
+      <p:cxnSp>
+        <p:nvCxnSpPr>
+          <p:cNvPr id="18" name="直接箭头连接符 17">
+            <a:extLst>
+              <a:ext uri="{FF2B5EF4-FFF2-40B4-BE49-F238E27FC236}">
+                <a16:creationId xmlns:a16="http://schemas.microsoft.com/office/drawing/2014/main" id="{6C38ED16-D566-01A0-0F9D-881FCBF84D22}"/>
+              </a:ext>
+            </a:extLst>
+          </p:cNvPr>
+          <p:cNvCxnSpPr>
+            <a:cxnSpLocks/>
+            <a:stCxn id="7" idx="0"/>
+            <a:endCxn id="13" idx="4"/>
+          </p:cNvCxnSpPr>
+          <p:nvPr/>
+        </p:nvCxnSpPr>
+        <p:spPr>
+          <a:xfrm flipH="1" flipV="1">
+            <a:off x="3004219" y="1798187"/>
+            <a:ext cx="1" cy="377505"/>
+          </a:xfrm>
+          <a:prstGeom prst="straightConnector1">
+            <a:avLst/>
+          </a:prstGeom>
+          <a:ln>
+            <a:tailEnd type="triangle"/>
+          </a:ln>
+        </p:spPr>
+        <p:style>
+          <a:lnRef idx="1">
+            <a:schemeClr val="accent1"/>
+          </a:lnRef>
+          <a:fillRef idx="0">
+            <a:schemeClr val="accent1"/>
+          </a:fillRef>
+          <a:effectRef idx="0">
+            <a:schemeClr val="accent1"/>
+          </a:effectRef>
+          <a:fontRef idx="minor">
+            <a:schemeClr val="tx1"/>
+          </a:fontRef>
+        </p:style>
+      </p:cxnSp>
+      <p:sp>
+        <p:nvSpPr>
+          <p:cNvPr id="21" name="椭圆 20">
+            <a:extLst>
+              <a:ext uri="{FF2B5EF4-FFF2-40B4-BE49-F238E27FC236}">
+                <a16:creationId xmlns:a16="http://schemas.microsoft.com/office/drawing/2014/main" id="{7885F1FA-C6BA-F001-6970-85C6D6E8C383}"/>
+              </a:ext>
+            </a:extLst>
+          </p:cNvPr>
+          <p:cNvSpPr/>
+          <p:nvPr/>
+        </p:nvSpPr>
+        <p:spPr>
+          <a:xfrm>
+            <a:off x="5021466" y="3307111"/>
+            <a:ext cx="1535186" cy="755009"/>
+          </a:xfrm>
+          <a:prstGeom prst="ellipse">
+            <a:avLst/>
+          </a:prstGeom>
+        </p:spPr>
+        <p:style>
+          <a:lnRef idx="1">
+            <a:schemeClr val="accent6"/>
+          </a:lnRef>
+          <a:fillRef idx="3">
+            <a:schemeClr val="accent6"/>
+          </a:fillRef>
+          <a:effectRef idx="2">
+            <a:schemeClr val="accent6"/>
+          </a:effectRef>
+          <a:fontRef idx="minor">
+            <a:schemeClr val="lt1"/>
+          </a:fontRef>
+        </p:style>
+        <p:txBody>
+          <a:bodyPr rtlCol="0" anchor="ctr"/>
+          <a:lstStyle/>
+          <a:p>
+            <a:pPr algn="ctr"/>
+            <a:r>
+              <a:rPr lang="en-US" altLang="zh-CN" dirty="0" err="1"/>
+              <a:t>xrun</a:t>
+            </a:r>
+            <a:endParaRPr lang="zh-CN" altLang="en-US" dirty="0"/>
+          </a:p>
+        </p:txBody>
+      </p:sp>
+      <p:sp>
+        <p:nvSpPr>
+          <p:cNvPr id="23" name="椭圆 22">
+            <a:extLst>
+              <a:ext uri="{FF2B5EF4-FFF2-40B4-BE49-F238E27FC236}">
+                <a16:creationId xmlns:a16="http://schemas.microsoft.com/office/drawing/2014/main" id="{247CD0A1-C5DF-206E-0F6B-03B311885476}"/>
+              </a:ext>
+            </a:extLst>
+          </p:cNvPr>
+          <p:cNvSpPr/>
+          <p:nvPr/>
+        </p:nvSpPr>
+        <p:spPr>
+          <a:xfrm>
+            <a:off x="7806307" y="3241741"/>
+            <a:ext cx="1535186" cy="755009"/>
+          </a:xfrm>
+          <a:prstGeom prst="ellipse">
+            <a:avLst/>
+          </a:prstGeom>
+        </p:spPr>
+        <p:style>
+          <a:lnRef idx="1">
+            <a:schemeClr val="accent6"/>
+          </a:lnRef>
+          <a:fillRef idx="3">
+            <a:schemeClr val="accent6"/>
+          </a:fillRef>
+          <a:effectRef idx="2">
+            <a:schemeClr val="accent6"/>
+          </a:effectRef>
+          <a:fontRef idx="minor">
+            <a:schemeClr val="lt1"/>
+          </a:fontRef>
+        </p:style>
+        <p:txBody>
+          <a:bodyPr rtlCol="0" anchor="ctr"/>
+          <a:lstStyle/>
+          <a:p>
+            <a:pPr algn="ctr"/>
+            <a:r>
+              <a:rPr lang="en-US" altLang="zh-CN" dirty="0" err="1"/>
+              <a:t>xgen</a:t>
+            </a:r>
+            <a:endParaRPr lang="zh-CN" altLang="en-US" dirty="0"/>
+          </a:p>
+        </p:txBody>
+      </p:sp>
+      <p:cxnSp>
+        <p:nvCxnSpPr>
+          <p:cNvPr id="25" name="直接箭头连接符 24">
+            <a:extLst>
+              <a:ext uri="{FF2B5EF4-FFF2-40B4-BE49-F238E27FC236}">
+                <a16:creationId xmlns:a16="http://schemas.microsoft.com/office/drawing/2014/main" id="{037351FC-F1A9-CA9B-BFA3-D54C6329ECCB}"/>
+              </a:ext>
+            </a:extLst>
+          </p:cNvPr>
+          <p:cNvCxnSpPr>
+            <a:cxnSpLocks/>
+            <a:stCxn id="2" idx="2"/>
+          </p:cNvCxnSpPr>
+          <p:nvPr/>
+        </p:nvCxnSpPr>
+        <p:spPr>
+          <a:xfrm flipH="1">
+            <a:off x="5789059" y="2743450"/>
+            <a:ext cx="1" cy="563661"/>
+          </a:xfrm>
+          <a:prstGeom prst="straightConnector1">
+            <a:avLst/>
+          </a:prstGeom>
+          <a:ln>
+            <a:tailEnd type="triangle"/>
+          </a:ln>
+        </p:spPr>
+        <p:style>
+          <a:lnRef idx="1">
+            <a:schemeClr val="accent1"/>
+          </a:lnRef>
+          <a:fillRef idx="0">
+            <a:schemeClr val="accent1"/>
+          </a:fillRef>
+          <a:effectRef idx="0">
+            <a:schemeClr val="accent1"/>
+          </a:effectRef>
+          <a:fontRef idx="minor">
+            <a:schemeClr val="tx1"/>
+          </a:fontRef>
+        </p:style>
+      </p:cxnSp>
+      <p:cxnSp>
+        <p:nvCxnSpPr>
+          <p:cNvPr id="30" name="直接箭头连接符 29">
+            <a:extLst>
+              <a:ext uri="{FF2B5EF4-FFF2-40B4-BE49-F238E27FC236}">
+                <a16:creationId xmlns:a16="http://schemas.microsoft.com/office/drawing/2014/main" id="{DF97E281-18CD-8A75-34E9-C37E9D5A1482}"/>
+              </a:ext>
+            </a:extLst>
+          </p:cNvPr>
+          <p:cNvCxnSpPr>
+            <a:cxnSpLocks/>
+          </p:cNvCxnSpPr>
+          <p:nvPr/>
+        </p:nvCxnSpPr>
+        <p:spPr>
+          <a:xfrm flipH="1">
+            <a:off x="8573899" y="2710765"/>
+            <a:ext cx="1" cy="563661"/>
+          </a:xfrm>
+          <a:prstGeom prst="straightConnector1">
+            <a:avLst/>
+          </a:prstGeom>
+          <a:ln>
+            <a:tailEnd type="triangle"/>
+          </a:ln>
+        </p:spPr>
+        <p:style>
+          <a:lnRef idx="1">
+            <a:schemeClr val="accent1"/>
+          </a:lnRef>
+          <a:fillRef idx="0">
+            <a:schemeClr val="accent1"/>
+          </a:fillRef>
+          <a:effectRef idx="0">
+            <a:schemeClr val="accent1"/>
+          </a:effectRef>
+          <a:fontRef idx="minor">
+            <a:schemeClr val="tx1"/>
+          </a:fontRef>
+        </p:style>
+      </p:cxnSp>
+      <p:sp>
+        <p:nvSpPr>
+          <p:cNvPr id="31" name="椭圆 30">
+            <a:extLst>
+              <a:ext uri="{FF2B5EF4-FFF2-40B4-BE49-F238E27FC236}">
+                <a16:creationId xmlns:a16="http://schemas.microsoft.com/office/drawing/2014/main" id="{6DCB1F4A-F4E2-31C3-CCA9-01D567645563}"/>
+              </a:ext>
+            </a:extLst>
+          </p:cNvPr>
+          <p:cNvSpPr/>
+          <p:nvPr/>
+        </p:nvSpPr>
+        <p:spPr>
+          <a:xfrm>
+            <a:off x="6413887" y="4182906"/>
+            <a:ext cx="1535186" cy="755009"/>
+          </a:xfrm>
+          <a:prstGeom prst="ellipse">
+            <a:avLst/>
+          </a:prstGeom>
+        </p:spPr>
+        <p:style>
+          <a:lnRef idx="1">
+            <a:schemeClr val="accent6"/>
+          </a:lnRef>
+          <a:fillRef idx="3">
+            <a:schemeClr val="accent6"/>
+          </a:fillRef>
+          <a:effectRef idx="2">
+            <a:schemeClr val="accent6"/>
+          </a:effectRef>
+          <a:fontRef idx="minor">
+            <a:schemeClr val="lt1"/>
+          </a:fontRef>
+        </p:style>
+        <p:txBody>
+          <a:bodyPr rtlCol="0" anchor="ctr"/>
+          <a:lstStyle/>
+          <a:p>
+            <a:pPr algn="ctr"/>
+            <a:r>
+              <a:rPr lang="en-US" altLang="zh-CN" dirty="0" err="1"/>
+              <a:t>xpl</a:t>
+            </a:r>
+            <a:endParaRPr lang="zh-CN" altLang="en-US" dirty="0"/>
+          </a:p>
+        </p:txBody>
+      </p:sp>
+      <p:cxnSp>
+        <p:nvCxnSpPr>
+          <p:cNvPr id="34" name="直接箭头连接符 33">
+            <a:extLst>
+              <a:ext uri="{FF2B5EF4-FFF2-40B4-BE49-F238E27FC236}">
+                <a16:creationId xmlns:a16="http://schemas.microsoft.com/office/drawing/2014/main" id="{03E2D0CA-D971-CD5D-F4A4-8E3C91EB0BD3}"/>
+              </a:ext>
+            </a:extLst>
+          </p:cNvPr>
+          <p:cNvCxnSpPr>
+            <a:endCxn id="31" idx="0"/>
+          </p:cNvCxnSpPr>
+          <p:nvPr/>
+        </p:nvCxnSpPr>
+        <p:spPr>
+          <a:xfrm>
+            <a:off x="6413887" y="3996750"/>
+            <a:ext cx="767593" cy="186156"/>
+          </a:xfrm>
+          <a:prstGeom prst="straightConnector1">
+            <a:avLst/>
+          </a:prstGeom>
+          <a:ln>
+            <a:tailEnd type="triangle"/>
+          </a:ln>
+        </p:spPr>
+        <p:style>
+          <a:lnRef idx="1">
+            <a:schemeClr val="accent1"/>
+          </a:lnRef>
+          <a:fillRef idx="0">
+            <a:schemeClr val="accent1"/>
+          </a:fillRef>
+          <a:effectRef idx="0">
+            <a:schemeClr val="accent1"/>
+          </a:effectRef>
+          <a:fontRef idx="minor">
+            <a:schemeClr val="tx1"/>
+          </a:fontRef>
+        </p:style>
+      </p:cxnSp>
+      <p:cxnSp>
+        <p:nvCxnSpPr>
+          <p:cNvPr id="36" name="直接箭头连接符 35">
+            <a:extLst>
+              <a:ext uri="{FF2B5EF4-FFF2-40B4-BE49-F238E27FC236}">
+                <a16:creationId xmlns:a16="http://schemas.microsoft.com/office/drawing/2014/main" id="{BC5C736D-6FF0-E019-8ADC-8463443F418D}"/>
+              </a:ext>
+            </a:extLst>
+          </p:cNvPr>
+          <p:cNvCxnSpPr>
+            <a:cxnSpLocks/>
+            <a:stCxn id="23" idx="3"/>
+          </p:cNvCxnSpPr>
+          <p:nvPr/>
+        </p:nvCxnSpPr>
+        <p:spPr>
+          <a:xfrm flipH="1">
+            <a:off x="7353542" y="3886181"/>
+            <a:ext cx="677588" cy="296725"/>
+          </a:xfrm>
+          <a:prstGeom prst="straightConnector1">
+            <a:avLst/>
+          </a:prstGeom>
+          <a:ln>
+            <a:tailEnd type="triangle"/>
+          </a:ln>
+        </p:spPr>
+        <p:style>
+          <a:lnRef idx="1">
+            <a:schemeClr val="accent1"/>
+          </a:lnRef>
+          <a:fillRef idx="0">
+            <a:schemeClr val="accent1"/>
+          </a:fillRef>
+          <a:effectRef idx="0">
+            <a:schemeClr val="accent1"/>
+          </a:effectRef>
+          <a:fontRef idx="minor">
+            <a:schemeClr val="tx1"/>
+          </a:fontRef>
+        </p:style>
+      </p:cxnSp>
+      <p:sp>
+        <p:nvSpPr>
+          <p:cNvPr id="41" name="椭圆 40">
+            <a:extLst>
+              <a:ext uri="{FF2B5EF4-FFF2-40B4-BE49-F238E27FC236}">
+                <a16:creationId xmlns:a16="http://schemas.microsoft.com/office/drawing/2014/main" id="{E1FE7052-4C92-423B-E029-D4E58F9E1327}"/>
+              </a:ext>
+            </a:extLst>
+          </p:cNvPr>
+          <p:cNvSpPr/>
+          <p:nvPr/>
+        </p:nvSpPr>
+        <p:spPr>
+          <a:xfrm>
+            <a:off x="5038748" y="5058701"/>
+            <a:ext cx="1535186" cy="755009"/>
+          </a:xfrm>
+          <a:prstGeom prst="ellipse">
+            <a:avLst/>
+          </a:prstGeom>
+        </p:spPr>
+        <p:style>
+          <a:lnRef idx="1">
+            <a:schemeClr val="accent6"/>
+          </a:lnRef>
+          <a:fillRef idx="3">
+            <a:schemeClr val="accent6"/>
+          </a:fillRef>
+          <a:effectRef idx="2">
+            <a:schemeClr val="accent6"/>
+          </a:effectRef>
+          <a:fontRef idx="minor">
+            <a:schemeClr val="lt1"/>
+          </a:fontRef>
+        </p:style>
+        <p:txBody>
+          <a:bodyPr rtlCol="0" anchor="ctr"/>
+          <a:lstStyle/>
+          <a:p>
+            <a:pPr algn="ctr"/>
+            <a:r>
+              <a:rPr lang="en-US" altLang="zh-CN" dirty="0" err="1"/>
+              <a:t>XScript</a:t>
+            </a:r>
+            <a:endParaRPr lang="zh-CN" altLang="en-US" dirty="0"/>
+          </a:p>
+        </p:txBody>
+      </p:sp>
+      <p:sp>
+        <p:nvSpPr>
+          <p:cNvPr id="42" name="椭圆 41">
+            <a:extLst>
+              <a:ext uri="{FF2B5EF4-FFF2-40B4-BE49-F238E27FC236}">
+                <a16:creationId xmlns:a16="http://schemas.microsoft.com/office/drawing/2014/main" id="{29BE41BB-BAD9-1D92-BDE9-6D9204991D39}"/>
+              </a:ext>
+            </a:extLst>
+          </p:cNvPr>
+          <p:cNvSpPr/>
+          <p:nvPr/>
+        </p:nvSpPr>
+        <p:spPr>
+          <a:xfrm>
+            <a:off x="7806307" y="5124071"/>
+            <a:ext cx="1535186" cy="755009"/>
+          </a:xfrm>
+          <a:prstGeom prst="ellipse">
+            <a:avLst/>
+          </a:prstGeom>
+        </p:spPr>
+        <p:style>
+          <a:lnRef idx="1">
+            <a:schemeClr val="accent6"/>
+          </a:lnRef>
+          <a:fillRef idx="3">
+            <a:schemeClr val="accent6"/>
+          </a:fillRef>
+          <a:effectRef idx="2">
+            <a:schemeClr val="accent6"/>
+          </a:effectRef>
+          <a:fontRef idx="minor">
+            <a:schemeClr val="lt1"/>
+          </a:fontRef>
+        </p:style>
+        <p:txBody>
+          <a:bodyPr rtlCol="0" anchor="ctr"/>
+          <a:lstStyle/>
+          <a:p>
+            <a:pPr algn="ctr"/>
+            <a:r>
+              <a:rPr lang="en-US" altLang="zh-CN" dirty="0" err="1"/>
+              <a:t>xlib</a:t>
+            </a:r>
+            <a:endParaRPr lang="zh-CN" altLang="en-US" dirty="0"/>
+          </a:p>
+        </p:txBody>
+      </p:sp>
+      <p:cxnSp>
+        <p:nvCxnSpPr>
+          <p:cNvPr id="44" name="直接箭头连接符 43">
+            <a:extLst>
+              <a:ext uri="{FF2B5EF4-FFF2-40B4-BE49-F238E27FC236}">
+                <a16:creationId xmlns:a16="http://schemas.microsoft.com/office/drawing/2014/main" id="{6F6EE4BB-82E1-1880-840D-DB99B9DD0E5A}"/>
+              </a:ext>
+            </a:extLst>
+          </p:cNvPr>
+          <p:cNvCxnSpPr>
+            <a:stCxn id="31" idx="3"/>
+            <a:endCxn id="41" idx="0"/>
+          </p:cNvCxnSpPr>
+          <p:nvPr/>
+        </p:nvCxnSpPr>
+        <p:spPr>
+          <a:xfrm flipH="1">
+            <a:off x="5806341" y="4827346"/>
+            <a:ext cx="832369" cy="231355"/>
+          </a:xfrm>
+          <a:prstGeom prst="straightConnector1">
+            <a:avLst/>
+          </a:prstGeom>
+          <a:ln>
+            <a:tailEnd type="triangle"/>
+          </a:ln>
+        </p:spPr>
+        <p:style>
+          <a:lnRef idx="1">
+            <a:schemeClr val="accent1"/>
+          </a:lnRef>
+          <a:fillRef idx="0">
+            <a:schemeClr val="accent1"/>
+          </a:fillRef>
+          <a:effectRef idx="0">
+            <a:schemeClr val="accent1"/>
+          </a:effectRef>
+          <a:fontRef idx="minor">
+            <a:schemeClr val="tx1"/>
+          </a:fontRef>
+        </p:style>
+      </p:cxnSp>
+      <p:cxnSp>
+        <p:nvCxnSpPr>
+          <p:cNvPr id="46" name="直接箭头连接符 45">
+            <a:extLst>
+              <a:ext uri="{FF2B5EF4-FFF2-40B4-BE49-F238E27FC236}">
+                <a16:creationId xmlns:a16="http://schemas.microsoft.com/office/drawing/2014/main" id="{56A05465-67ED-C3E9-6E17-E4DF7630A90D}"/>
+              </a:ext>
+            </a:extLst>
+          </p:cNvPr>
+          <p:cNvCxnSpPr>
+            <a:stCxn id="31" idx="5"/>
+            <a:endCxn id="42" idx="0"/>
+          </p:cNvCxnSpPr>
+          <p:nvPr/>
+        </p:nvCxnSpPr>
+        <p:spPr>
+          <a:xfrm>
+            <a:off x="7724250" y="4827346"/>
+            <a:ext cx="849650" cy="296725"/>
+          </a:xfrm>
+          <a:prstGeom prst="straightConnector1">
+            <a:avLst/>
+          </a:prstGeom>
+          <a:ln>
+            <a:tailEnd type="triangle"/>
+          </a:ln>
+        </p:spPr>
+        <p:style>
+          <a:lnRef idx="1">
+            <a:schemeClr val="accent1"/>
+          </a:lnRef>
+          <a:fillRef idx="0">
+            <a:schemeClr val="accent1"/>
+          </a:fillRef>
+          <a:effectRef idx="0">
+            <a:schemeClr val="accent1"/>
+          </a:effectRef>
+          <a:fontRef idx="minor">
+            <a:schemeClr val="tx1"/>
+          </a:fontRef>
+        </p:style>
+      </p:cxnSp>
+      <p:sp>
+        <p:nvSpPr>
+          <p:cNvPr id="48" name="椭圆 47">
+            <a:extLst>
+              <a:ext uri="{FF2B5EF4-FFF2-40B4-BE49-F238E27FC236}">
+                <a16:creationId xmlns:a16="http://schemas.microsoft.com/office/drawing/2014/main" id="{420F48AE-3B30-D02F-0211-3C5E4EFD7632}"/>
+              </a:ext>
+            </a:extLst>
+          </p:cNvPr>
+          <p:cNvSpPr/>
+          <p:nvPr/>
+        </p:nvSpPr>
+        <p:spPr>
+          <a:xfrm>
+            <a:off x="2735969" y="5042959"/>
+            <a:ext cx="1535186" cy="755009"/>
+          </a:xfrm>
+          <a:prstGeom prst="ellipse">
+            <a:avLst/>
+          </a:prstGeom>
+        </p:spPr>
+        <p:style>
+          <a:lnRef idx="1">
+            <a:schemeClr val="accent4"/>
+          </a:lnRef>
+          <a:fillRef idx="2">
+            <a:schemeClr val="accent4"/>
+          </a:fillRef>
+          <a:effectRef idx="1">
+            <a:schemeClr val="accent4"/>
+          </a:effectRef>
+          <a:fontRef idx="minor">
+            <a:schemeClr val="dk1"/>
+          </a:fontRef>
+        </p:style>
+        <p:txBody>
+          <a:bodyPr rtlCol="0" anchor="ctr"/>
+          <a:lstStyle/>
+          <a:p>
+            <a:pPr algn="ctr"/>
+            <a:r>
+              <a:rPr lang="en-US" altLang="zh-CN" dirty="0" err="1"/>
+              <a:t>antlr</a:t>
+            </a:r>
+            <a:endParaRPr lang="zh-CN" altLang="en-US" dirty="0"/>
+          </a:p>
+        </p:txBody>
+      </p:sp>
+      <p:cxnSp>
+        <p:nvCxnSpPr>
+          <p:cNvPr id="50" name="直接箭头连接符 49">
+            <a:extLst>
+              <a:ext uri="{FF2B5EF4-FFF2-40B4-BE49-F238E27FC236}">
+                <a16:creationId xmlns:a16="http://schemas.microsoft.com/office/drawing/2014/main" id="{E4584BBF-4589-19B6-153B-DCF6A59CC88B}"/>
+              </a:ext>
+            </a:extLst>
+          </p:cNvPr>
+          <p:cNvCxnSpPr>
+            <a:stCxn id="41" idx="2"/>
+            <a:endCxn id="48" idx="6"/>
+          </p:cNvCxnSpPr>
+          <p:nvPr/>
+        </p:nvCxnSpPr>
+        <p:spPr>
+          <a:xfrm flipH="1" flipV="1">
+            <a:off x="4271155" y="5420464"/>
+            <a:ext cx="767593" cy="15742"/>
+          </a:xfrm>
+          <a:prstGeom prst="straightConnector1">
+            <a:avLst/>
+          </a:prstGeom>
+          <a:ln>
+            <a:tailEnd type="triangle"/>
+          </a:ln>
+        </p:spPr>
+        <p:style>
+          <a:lnRef idx="1">
+            <a:schemeClr val="accent1"/>
+          </a:lnRef>
+          <a:fillRef idx="0">
+            <a:schemeClr val="accent1"/>
+          </a:fillRef>
+          <a:effectRef idx="0">
+            <a:schemeClr val="accent1"/>
+          </a:effectRef>
+          <a:fontRef idx="minor">
+            <a:schemeClr val="tx1"/>
+          </a:fontRef>
+        </p:style>
+      </p:cxnSp>
+    </p:spTree>
+    <p:extLst>
+      <p:ext uri="{BB962C8B-B14F-4D97-AF65-F5344CB8AC3E}">
+        <p14:creationId xmlns:p14="http://schemas.microsoft.com/office/powerpoint/2010/main" val="207981529"/>
+      </p:ext>
+    </p:extLst>
+  </p:cSld>
+  <p:clrMapOvr>
+    <a:masterClrMapping/>
+  </p:clrMapOvr>
+</p:sld>
+</file>
+
+<file path=ppt/slides/slide12.xml><?xml version="1.0" encoding="utf-8"?>
+<p:sld xmlns:a="http://schemas.openxmlformats.org/drawingml/2006/main" xmlns:r="http://schemas.openxmlformats.org/officeDocument/2006/relationships" xmlns:p="http://schemas.openxmlformats.org/presentationml/2006/main">
+  <p:cSld>
+    <p:spTree>
+      <p:nvGrpSpPr>
+        <p:cNvPr id="1" name=""/>
+        <p:cNvGrpSpPr/>
+        <p:nvPr/>
+      </p:nvGrpSpPr>
+      <p:grpSpPr>
+        <a:xfrm>
+          <a:off x="0" y="0"/>
+          <a:ext cx="0" cy="0"/>
+          <a:chOff x="0" y="0"/>
+          <a:chExt cx="0" cy="0"/>
+        </a:xfrm>
+      </p:grpSpPr>
+      <p:sp>
+        <p:nvSpPr>
+          <p:cNvPr id="4" name="矩形: 圆角 3">
+            <a:extLst>
+              <a:ext uri="{FF2B5EF4-FFF2-40B4-BE49-F238E27FC236}">
+                <a16:creationId xmlns:a16="http://schemas.microsoft.com/office/drawing/2014/main" id="{CA2474A9-607C-5172-E7FF-D094E349B507}"/>
+              </a:ext>
+            </a:extLst>
+          </p:cNvPr>
+          <p:cNvSpPr/>
+          <p:nvPr/>
+        </p:nvSpPr>
+        <p:spPr>
+          <a:xfrm>
+            <a:off x="1820412" y="2978093"/>
+            <a:ext cx="1828800" cy="637563"/>
+          </a:xfrm>
+          <a:prstGeom prst="roundRect">
+            <a:avLst/>
+          </a:prstGeom>
+        </p:spPr>
+        <p:style>
+          <a:lnRef idx="1">
+            <a:schemeClr val="accent2"/>
+          </a:lnRef>
+          <a:fillRef idx="3">
+            <a:schemeClr val="accent2"/>
+          </a:fillRef>
+          <a:effectRef idx="2">
+            <a:schemeClr val="accent2"/>
+          </a:effectRef>
+          <a:fontRef idx="minor">
+            <a:schemeClr val="lt1"/>
+          </a:fontRef>
+        </p:style>
+        <p:txBody>
+          <a:bodyPr rtlCol="0" anchor="ctr"/>
+          <a:lstStyle/>
+          <a:p>
+            <a:pPr algn="ctr"/>
+            <a:r>
+              <a:rPr lang="en-US" altLang="zh-CN" dirty="0" err="1"/>
+              <a:t>workbook.xdef</a:t>
+            </a:r>
+            <a:endParaRPr lang="zh-CN" altLang="en-US" dirty="0"/>
+          </a:p>
+        </p:txBody>
+      </p:sp>
+      <p:sp>
+        <p:nvSpPr>
+          <p:cNvPr id="6" name="矩形 5">
+            <a:extLst>
+              <a:ext uri="{FF2B5EF4-FFF2-40B4-BE49-F238E27FC236}">
+                <a16:creationId xmlns:a16="http://schemas.microsoft.com/office/drawing/2014/main" id="{625282FE-40F5-6FA3-C49D-28677098D6E1}"/>
+              </a:ext>
+            </a:extLst>
+          </p:cNvPr>
+          <p:cNvSpPr/>
+          <p:nvPr/>
+        </p:nvSpPr>
+        <p:spPr>
+          <a:xfrm>
+            <a:off x="4379054" y="2978093"/>
+            <a:ext cx="1879134" cy="637563"/>
+          </a:xfrm>
+          <a:prstGeom prst="rect">
+            <a:avLst/>
+          </a:prstGeom>
+        </p:spPr>
+        <p:style>
+          <a:lnRef idx="2">
+            <a:schemeClr val="accent1">
+              <a:shade val="15000"/>
+            </a:schemeClr>
+          </a:lnRef>
+          <a:fillRef idx="1">
+            <a:schemeClr val="accent1"/>
+          </a:fillRef>
+          <a:effectRef idx="0">
+            <a:schemeClr val="accent1"/>
+          </a:effectRef>
+          <a:fontRef idx="minor">
+            <a:schemeClr val="lt1"/>
+          </a:fontRef>
+        </p:style>
+        <p:txBody>
+          <a:bodyPr rtlCol="0" anchor="ctr"/>
+          <a:lstStyle/>
+          <a:p>
+            <a:pPr algn="ctr"/>
+            <a:r>
+              <a:rPr lang="en-US" altLang="zh-CN" dirty="0" err="1"/>
+              <a:t>ExcelWorkbook</a:t>
+            </a:r>
+            <a:endParaRPr lang="zh-CN" altLang="en-US" dirty="0"/>
+          </a:p>
+        </p:txBody>
+      </p:sp>
+      <p:sp>
+        <p:nvSpPr>
+          <p:cNvPr id="9" name="椭圆 8">
+            <a:extLst>
+              <a:ext uri="{FF2B5EF4-FFF2-40B4-BE49-F238E27FC236}">
+                <a16:creationId xmlns:a16="http://schemas.microsoft.com/office/drawing/2014/main" id="{F2B7E787-DAA8-200C-3A3B-13F5E64B0A59}"/>
+              </a:ext>
+            </a:extLst>
+          </p:cNvPr>
+          <p:cNvSpPr/>
+          <p:nvPr/>
+        </p:nvSpPr>
+        <p:spPr>
+          <a:xfrm>
+            <a:off x="7086861" y="2223084"/>
+            <a:ext cx="1535186" cy="755009"/>
+          </a:xfrm>
+          <a:prstGeom prst="ellipse">
+            <a:avLst/>
+          </a:prstGeom>
+        </p:spPr>
+        <p:style>
+          <a:lnRef idx="1">
+            <a:schemeClr val="accent2"/>
+          </a:lnRef>
+          <a:fillRef idx="2">
+            <a:schemeClr val="accent2"/>
+          </a:fillRef>
+          <a:effectRef idx="1">
+            <a:schemeClr val="accent2"/>
+          </a:effectRef>
+          <a:fontRef idx="minor">
+            <a:schemeClr val="dk1"/>
+          </a:fontRef>
+        </p:style>
+        <p:txBody>
+          <a:bodyPr rtlCol="0" anchor="ctr"/>
+          <a:lstStyle/>
+          <a:p>
+            <a:pPr algn="ctr"/>
+            <a:r>
+              <a:rPr lang="en-US" altLang="zh-CN" dirty="0"/>
+              <a:t>xpt.xml</a:t>
+            </a:r>
+            <a:endParaRPr lang="zh-CN" altLang="en-US" dirty="0"/>
+          </a:p>
+        </p:txBody>
+      </p:sp>
+      <p:sp>
+        <p:nvSpPr>
+          <p:cNvPr id="11" name="椭圆 10">
+            <a:extLst>
+              <a:ext uri="{FF2B5EF4-FFF2-40B4-BE49-F238E27FC236}">
+                <a16:creationId xmlns:a16="http://schemas.microsoft.com/office/drawing/2014/main" id="{5F1E3CD5-D3DD-B4A6-6F14-7654F4543397}"/>
+              </a:ext>
+            </a:extLst>
+          </p:cNvPr>
+          <p:cNvSpPr/>
+          <p:nvPr/>
+        </p:nvSpPr>
+        <p:spPr>
+          <a:xfrm>
+            <a:off x="7086861" y="3761465"/>
+            <a:ext cx="1535186" cy="755009"/>
+          </a:xfrm>
+          <a:prstGeom prst="ellipse">
+            <a:avLst/>
+          </a:prstGeom>
+        </p:spPr>
+        <p:style>
+          <a:lnRef idx="1">
+            <a:schemeClr val="accent2"/>
+          </a:lnRef>
+          <a:fillRef idx="2">
+            <a:schemeClr val="accent2"/>
+          </a:fillRef>
+          <a:effectRef idx="1">
+            <a:schemeClr val="accent2"/>
+          </a:effectRef>
+          <a:fontRef idx="minor">
+            <a:schemeClr val="dk1"/>
+          </a:fontRef>
+        </p:style>
+        <p:txBody>
+          <a:bodyPr rtlCol="0" anchor="ctr"/>
+          <a:lstStyle/>
+          <a:p>
+            <a:pPr algn="ctr"/>
+            <a:r>
+              <a:rPr lang="en-US" altLang="zh-CN" dirty="0"/>
+              <a:t>xlsx</a:t>
+            </a:r>
+            <a:endParaRPr lang="zh-CN" altLang="en-US" dirty="0"/>
+          </a:p>
+        </p:txBody>
+      </p:sp>
+      <p:cxnSp>
+        <p:nvCxnSpPr>
+          <p:cNvPr id="15" name="直接箭头连接符 14">
+            <a:extLst>
+              <a:ext uri="{FF2B5EF4-FFF2-40B4-BE49-F238E27FC236}">
+                <a16:creationId xmlns:a16="http://schemas.microsoft.com/office/drawing/2014/main" id="{E7271A65-2613-F194-8FC2-88E8E074128F}"/>
+              </a:ext>
+            </a:extLst>
+          </p:cNvPr>
+          <p:cNvCxnSpPr>
+            <a:stCxn id="4" idx="3"/>
+            <a:endCxn id="6" idx="1"/>
+          </p:cNvCxnSpPr>
+          <p:nvPr/>
+        </p:nvCxnSpPr>
+        <p:spPr>
+          <a:xfrm>
+            <a:off x="3649212" y="3296875"/>
+            <a:ext cx="729842" cy="0"/>
+          </a:xfrm>
+          <a:prstGeom prst="straightConnector1">
+            <a:avLst/>
+          </a:prstGeom>
+          <a:ln>
+            <a:tailEnd type="triangle"/>
+          </a:ln>
+        </p:spPr>
+        <p:style>
+          <a:lnRef idx="1">
+            <a:schemeClr val="accent1"/>
+          </a:lnRef>
+          <a:fillRef idx="0">
+            <a:schemeClr val="accent1"/>
+          </a:fillRef>
+          <a:effectRef idx="0">
+            <a:schemeClr val="accent1"/>
+          </a:effectRef>
+          <a:fontRef idx="minor">
+            <a:schemeClr val="tx1"/>
+          </a:fontRef>
+        </p:style>
+      </p:cxnSp>
+      <p:sp>
+        <p:nvSpPr>
+          <p:cNvPr id="17" name="箭头: 左右 16">
+            <a:extLst>
+              <a:ext uri="{FF2B5EF4-FFF2-40B4-BE49-F238E27FC236}">
+                <a16:creationId xmlns:a16="http://schemas.microsoft.com/office/drawing/2014/main" id="{2966D1A3-C938-1192-4518-F6486A521E5C}"/>
+              </a:ext>
+            </a:extLst>
+          </p:cNvPr>
+          <p:cNvSpPr/>
+          <p:nvPr/>
+        </p:nvSpPr>
+        <p:spPr>
+          <a:xfrm rot="20052450" flipV="1">
+            <a:off x="6333124" y="2818741"/>
+            <a:ext cx="762283" cy="135255"/>
+          </a:xfrm>
+          <a:prstGeom prst="leftRightArrow">
+            <a:avLst/>
+          </a:prstGeom>
+        </p:spPr>
+        <p:style>
+          <a:lnRef idx="1">
+            <a:schemeClr val="dk1"/>
+          </a:lnRef>
+          <a:fillRef idx="3">
+            <a:schemeClr val="dk1"/>
+          </a:fillRef>
+          <a:effectRef idx="2">
+            <a:schemeClr val="dk1"/>
+          </a:effectRef>
+          <a:fontRef idx="minor">
+            <a:schemeClr val="lt1"/>
+          </a:fontRef>
+        </p:style>
+        <p:txBody>
+          <a:bodyPr rtlCol="0" anchor="ctr"/>
+          <a:lstStyle/>
+          <a:p>
+            <a:pPr algn="ctr"/>
+            <a:endParaRPr lang="zh-CN" altLang="en-US"/>
+          </a:p>
+        </p:txBody>
+      </p:sp>
+      <p:sp>
+        <p:nvSpPr>
+          <p:cNvPr id="19" name="箭头: 左右 18">
+            <a:extLst>
+              <a:ext uri="{FF2B5EF4-FFF2-40B4-BE49-F238E27FC236}">
+                <a16:creationId xmlns:a16="http://schemas.microsoft.com/office/drawing/2014/main" id="{C8BC73F6-34DE-2299-6EDF-EB50E3441528}"/>
+              </a:ext>
+            </a:extLst>
+          </p:cNvPr>
+          <p:cNvSpPr/>
+          <p:nvPr/>
+        </p:nvSpPr>
+        <p:spPr>
+          <a:xfrm rot="1602616" flipV="1">
+            <a:off x="6334852" y="3769268"/>
+            <a:ext cx="762283" cy="135255"/>
+          </a:xfrm>
+          <a:prstGeom prst="leftRightArrow">
+            <a:avLst/>
+          </a:prstGeom>
+        </p:spPr>
+        <p:style>
+          <a:lnRef idx="1">
+            <a:schemeClr val="dk1"/>
+          </a:lnRef>
+          <a:fillRef idx="3">
+            <a:schemeClr val="dk1"/>
+          </a:fillRef>
+          <a:effectRef idx="2">
+            <a:schemeClr val="dk1"/>
+          </a:effectRef>
+          <a:fontRef idx="minor">
+            <a:schemeClr val="lt1"/>
+          </a:fontRef>
+        </p:style>
+        <p:txBody>
+          <a:bodyPr rtlCol="0" anchor="ctr"/>
+          <a:lstStyle/>
+          <a:p>
+            <a:pPr algn="ctr"/>
+            <a:endParaRPr lang="zh-CN" altLang="en-US"/>
+          </a:p>
+        </p:txBody>
+      </p:sp>
+    </p:spTree>
+    <p:extLst>
+      <p:ext uri="{BB962C8B-B14F-4D97-AF65-F5344CB8AC3E}">
+        <p14:creationId xmlns:p14="http://schemas.microsoft.com/office/powerpoint/2010/main" val="885740046"/>
+      </p:ext>
+    </p:extLst>
+  </p:cSld>
+  <p:clrMapOvr>
+    <a:masterClrMapping/>
+  </p:clrMapOvr>
+</p:sld>
+</file>
+
+<file path=ppt/slides/slide13.xml><?xml version="1.0" encoding="utf-8"?>
+<p:sld xmlns:a="http://schemas.openxmlformats.org/drawingml/2006/main" xmlns:r="http://schemas.openxmlformats.org/officeDocument/2006/relationships" xmlns:p="http://schemas.openxmlformats.org/presentationml/2006/main">
+  <p:cSld>
+    <p:spTree>
+      <p:nvGrpSpPr>
+        <p:cNvPr id="1" name=""/>
+        <p:cNvGrpSpPr/>
+        <p:nvPr/>
+      </p:nvGrpSpPr>
+      <p:grpSpPr>
+        <a:xfrm>
+          <a:off x="0" y="0"/>
+          <a:ext cx="0" cy="0"/>
+          <a:chOff x="0" y="0"/>
+          <a:chExt cx="0" cy="0"/>
+        </a:xfrm>
+      </p:grpSpPr>
+      <p:sp>
+        <p:nvSpPr>
+          <p:cNvPr id="6" name="矩形 5">
+            <a:extLst>
+              <a:ext uri="{FF2B5EF4-FFF2-40B4-BE49-F238E27FC236}">
+                <a16:creationId xmlns:a16="http://schemas.microsoft.com/office/drawing/2014/main" id="{625282FE-40F5-6FA3-C49D-28677098D6E1}"/>
+              </a:ext>
+            </a:extLst>
+          </p:cNvPr>
+          <p:cNvSpPr/>
+          <p:nvPr/>
+        </p:nvSpPr>
+        <p:spPr>
+          <a:xfrm>
+            <a:off x="2013359" y="2860647"/>
+            <a:ext cx="1879134" cy="637563"/>
+          </a:xfrm>
+          <a:prstGeom prst="rect">
+            <a:avLst/>
+          </a:prstGeom>
+        </p:spPr>
+        <p:style>
+          <a:lnRef idx="2">
+            <a:schemeClr val="accent1">
+              <a:shade val="15000"/>
+            </a:schemeClr>
+          </a:lnRef>
+          <a:fillRef idx="1">
+            <a:schemeClr val="accent1"/>
+          </a:fillRef>
+          <a:effectRef idx="0">
+            <a:schemeClr val="accent1"/>
+          </a:effectRef>
+          <a:fontRef idx="minor">
+            <a:schemeClr val="lt1"/>
+          </a:fontRef>
+        </p:style>
+        <p:txBody>
+          <a:bodyPr rtlCol="0" anchor="ctr"/>
+          <a:lstStyle/>
+          <a:p>
+            <a:pPr algn="ctr"/>
+            <a:r>
+              <a:rPr lang="en-US" altLang="zh-CN" dirty="0" err="1"/>
+              <a:t>ExcelWorkbook</a:t>
+            </a:r>
+            <a:endParaRPr lang="zh-CN" altLang="en-US" dirty="0"/>
+          </a:p>
+        </p:txBody>
+      </p:sp>
+      <p:sp>
+        <p:nvSpPr>
+          <p:cNvPr id="9" name="椭圆 8">
+            <a:extLst>
+              <a:ext uri="{FF2B5EF4-FFF2-40B4-BE49-F238E27FC236}">
+                <a16:creationId xmlns:a16="http://schemas.microsoft.com/office/drawing/2014/main" id="{F2B7E787-DAA8-200C-3A3B-13F5E64B0A59}"/>
+              </a:ext>
+            </a:extLst>
+          </p:cNvPr>
+          <p:cNvSpPr/>
+          <p:nvPr/>
+        </p:nvSpPr>
+        <p:spPr>
+          <a:xfrm>
+            <a:off x="4348570" y="528210"/>
+            <a:ext cx="1535186" cy="755009"/>
+          </a:xfrm>
+          <a:prstGeom prst="ellipse">
+            <a:avLst/>
+          </a:prstGeom>
+        </p:spPr>
+        <p:style>
+          <a:lnRef idx="1">
+            <a:schemeClr val="accent2"/>
+          </a:lnRef>
+          <a:fillRef idx="2">
+            <a:schemeClr val="accent2"/>
+          </a:fillRef>
+          <a:effectRef idx="1">
+            <a:schemeClr val="accent2"/>
+          </a:effectRef>
+          <a:fontRef idx="minor">
+            <a:schemeClr val="dk1"/>
+          </a:fontRef>
+        </p:style>
+        <p:txBody>
+          <a:bodyPr rtlCol="0" anchor="ctr"/>
+          <a:lstStyle/>
+          <a:p>
+            <a:pPr algn="ctr"/>
+            <a:r>
+              <a:rPr lang="en-US" altLang="zh-CN" dirty="0"/>
+              <a:t>imp.xml</a:t>
+            </a:r>
+            <a:endParaRPr lang="zh-CN" altLang="en-US" dirty="0"/>
+          </a:p>
+        </p:txBody>
+      </p:sp>
+      <p:sp>
+        <p:nvSpPr>
+          <p:cNvPr id="11" name="椭圆 10">
+            <a:extLst>
+              <a:ext uri="{FF2B5EF4-FFF2-40B4-BE49-F238E27FC236}">
+                <a16:creationId xmlns:a16="http://schemas.microsoft.com/office/drawing/2014/main" id="{5F1E3CD5-D3DD-B4A6-6F14-7654F4543397}"/>
+              </a:ext>
+            </a:extLst>
+          </p:cNvPr>
+          <p:cNvSpPr/>
+          <p:nvPr/>
+        </p:nvSpPr>
+        <p:spPr>
+          <a:xfrm>
+            <a:off x="4348570" y="5079534"/>
+            <a:ext cx="1535186" cy="755009"/>
+          </a:xfrm>
+          <a:prstGeom prst="ellipse">
+            <a:avLst/>
+          </a:prstGeom>
+        </p:spPr>
+        <p:style>
+          <a:lnRef idx="1">
+            <a:schemeClr val="accent2"/>
+          </a:lnRef>
+          <a:fillRef idx="2">
+            <a:schemeClr val="accent2"/>
+          </a:fillRef>
+          <a:effectRef idx="1">
+            <a:schemeClr val="accent2"/>
+          </a:effectRef>
+          <a:fontRef idx="minor">
+            <a:schemeClr val="dk1"/>
+          </a:fontRef>
+        </p:style>
+        <p:txBody>
+          <a:bodyPr rtlCol="0" anchor="ctr"/>
+          <a:lstStyle/>
+          <a:p>
+            <a:pPr algn="ctr"/>
+            <a:r>
+              <a:rPr lang="en-US" altLang="zh-CN" dirty="0"/>
+              <a:t>xpt.xml</a:t>
+            </a:r>
+            <a:endParaRPr lang="zh-CN" altLang="en-US" dirty="0"/>
+          </a:p>
+        </p:txBody>
+      </p:sp>
+      <p:sp>
+        <p:nvSpPr>
+          <p:cNvPr id="2" name="矩形 1">
+            <a:extLst>
+              <a:ext uri="{FF2B5EF4-FFF2-40B4-BE49-F238E27FC236}">
+                <a16:creationId xmlns:a16="http://schemas.microsoft.com/office/drawing/2014/main" id="{DAF98117-A513-8C5B-7414-2CE93D825492}"/>
+              </a:ext>
+            </a:extLst>
+          </p:cNvPr>
+          <p:cNvSpPr/>
+          <p:nvPr/>
+        </p:nvSpPr>
+        <p:spPr>
+          <a:xfrm>
+            <a:off x="6353263" y="2860647"/>
+            <a:ext cx="1879134" cy="637563"/>
+          </a:xfrm>
+          <a:prstGeom prst="rect">
+            <a:avLst/>
+          </a:prstGeom>
+        </p:spPr>
+        <p:style>
+          <a:lnRef idx="2">
+            <a:schemeClr val="accent1">
+              <a:shade val="15000"/>
+            </a:schemeClr>
+          </a:lnRef>
+          <a:fillRef idx="1">
+            <a:schemeClr val="accent1"/>
+          </a:fillRef>
+          <a:effectRef idx="0">
+            <a:schemeClr val="accent1"/>
+          </a:effectRef>
+          <a:fontRef idx="minor">
+            <a:schemeClr val="lt1"/>
+          </a:fontRef>
+        </p:style>
+        <p:txBody>
+          <a:bodyPr rtlCol="0" anchor="ctr"/>
+          <a:lstStyle/>
+          <a:p>
+            <a:pPr algn="ctr"/>
+            <a:r>
+              <a:rPr lang="en-US" altLang="zh-CN" dirty="0" err="1"/>
+              <a:t>ModelObject</a:t>
+            </a:r>
+            <a:endParaRPr lang="zh-CN" altLang="en-US" dirty="0"/>
+          </a:p>
+        </p:txBody>
+      </p:sp>
+      <p:sp>
+        <p:nvSpPr>
+          <p:cNvPr id="3" name="箭头: 右 2">
+            <a:extLst>
+              <a:ext uri="{FF2B5EF4-FFF2-40B4-BE49-F238E27FC236}">
+                <a16:creationId xmlns:a16="http://schemas.microsoft.com/office/drawing/2014/main" id="{A809412A-3014-765F-069B-279957884978}"/>
+              </a:ext>
+            </a:extLst>
+          </p:cNvPr>
+          <p:cNvSpPr/>
+          <p:nvPr/>
+        </p:nvSpPr>
+        <p:spPr>
+          <a:xfrm>
+            <a:off x="4251958" y="2925660"/>
+            <a:ext cx="1844042" cy="153099"/>
+          </a:xfrm>
+          <a:prstGeom prst="rightArrow">
+            <a:avLst/>
+          </a:prstGeom>
+        </p:spPr>
+        <p:style>
+          <a:lnRef idx="2">
+            <a:schemeClr val="dk1">
+              <a:shade val="15000"/>
+            </a:schemeClr>
+          </a:lnRef>
+          <a:fillRef idx="1">
+            <a:schemeClr val="dk1"/>
+          </a:fillRef>
+          <a:effectRef idx="0">
+            <a:schemeClr val="dk1"/>
+          </a:effectRef>
+          <a:fontRef idx="minor">
+            <a:schemeClr val="lt1"/>
+          </a:fontRef>
+        </p:style>
+        <p:txBody>
+          <a:bodyPr rtlCol="0" anchor="ctr"/>
+          <a:lstStyle/>
+          <a:p>
+            <a:pPr algn="ctr"/>
+            <a:endParaRPr lang="zh-CN" altLang="en-US"/>
+          </a:p>
+        </p:txBody>
+      </p:sp>
+      <p:sp>
+        <p:nvSpPr>
+          <p:cNvPr id="5" name="箭头: 左 4">
+            <a:extLst>
+              <a:ext uri="{FF2B5EF4-FFF2-40B4-BE49-F238E27FC236}">
+                <a16:creationId xmlns:a16="http://schemas.microsoft.com/office/drawing/2014/main" id="{C1BD6AC8-D67C-B506-A347-2FED2B88656B}"/>
+              </a:ext>
+            </a:extLst>
+          </p:cNvPr>
+          <p:cNvSpPr/>
+          <p:nvPr/>
+        </p:nvSpPr>
+        <p:spPr>
+          <a:xfrm>
+            <a:off x="4216866" y="3294776"/>
+            <a:ext cx="1879134" cy="153100"/>
+          </a:xfrm>
+          <a:prstGeom prst="leftArrow">
+            <a:avLst/>
+          </a:prstGeom>
+        </p:spPr>
+        <p:style>
+          <a:lnRef idx="2">
+            <a:schemeClr val="dk1">
+              <a:shade val="15000"/>
+            </a:schemeClr>
+          </a:lnRef>
+          <a:fillRef idx="1">
+            <a:schemeClr val="dk1"/>
+          </a:fillRef>
+          <a:effectRef idx="0">
+            <a:schemeClr val="dk1"/>
+          </a:effectRef>
+          <a:fontRef idx="minor">
+            <a:schemeClr val="lt1"/>
+          </a:fontRef>
+        </p:style>
+        <p:txBody>
+          <a:bodyPr rtlCol="0" anchor="ctr"/>
+          <a:lstStyle/>
+          <a:p>
+            <a:pPr algn="ctr"/>
+            <a:endParaRPr lang="zh-CN" altLang="en-US"/>
+          </a:p>
+        </p:txBody>
+      </p:sp>
+      <p:cxnSp>
+        <p:nvCxnSpPr>
+          <p:cNvPr id="8" name="直接箭头连接符 7">
+            <a:extLst>
+              <a:ext uri="{FF2B5EF4-FFF2-40B4-BE49-F238E27FC236}">
+                <a16:creationId xmlns:a16="http://schemas.microsoft.com/office/drawing/2014/main" id="{713101D1-0272-9C69-7F4D-4D62C9DBBA92}"/>
+              </a:ext>
+            </a:extLst>
+          </p:cNvPr>
+          <p:cNvCxnSpPr/>
+          <p:nvPr/>
+        </p:nvCxnSpPr>
+        <p:spPr>
+          <a:xfrm>
+            <a:off x="5116163" y="2583809"/>
+            <a:ext cx="0" cy="276838"/>
+          </a:xfrm>
+          <a:prstGeom prst="straightConnector1">
+            <a:avLst/>
+          </a:prstGeom>
+          <a:ln>
+            <a:tailEnd type="triangle"/>
+          </a:ln>
+        </p:spPr>
+        <p:style>
+          <a:lnRef idx="1">
+            <a:schemeClr val="accent1"/>
+          </a:lnRef>
+          <a:fillRef idx="0">
+            <a:schemeClr val="accent1"/>
+          </a:fillRef>
+          <a:effectRef idx="0">
+            <a:schemeClr val="accent1"/>
+          </a:effectRef>
+          <a:fontRef idx="minor">
+            <a:schemeClr val="tx1"/>
+          </a:fontRef>
+        </p:style>
+      </p:cxnSp>
+      <p:cxnSp>
+        <p:nvCxnSpPr>
+          <p:cNvPr id="12" name="直接箭头连接符 11">
+            <a:extLst>
+              <a:ext uri="{FF2B5EF4-FFF2-40B4-BE49-F238E27FC236}">
+                <a16:creationId xmlns:a16="http://schemas.microsoft.com/office/drawing/2014/main" id="{9B31E8F1-5B7D-3C47-69F5-074466530431}"/>
+              </a:ext>
+            </a:extLst>
+          </p:cNvPr>
+          <p:cNvCxnSpPr/>
+          <p:nvPr/>
+        </p:nvCxnSpPr>
+        <p:spPr>
+          <a:xfrm flipV="1">
+            <a:off x="5116163" y="3498210"/>
+            <a:ext cx="0" cy="478172"/>
+          </a:xfrm>
+          <a:prstGeom prst="straightConnector1">
+            <a:avLst/>
+          </a:prstGeom>
+          <a:ln>
+            <a:tailEnd type="triangle"/>
+          </a:ln>
+        </p:spPr>
+        <p:style>
+          <a:lnRef idx="1">
+            <a:schemeClr val="accent1"/>
+          </a:lnRef>
+          <a:fillRef idx="0">
+            <a:schemeClr val="accent1"/>
+          </a:fillRef>
+          <a:effectRef idx="0">
+            <a:schemeClr val="accent1"/>
+          </a:effectRef>
+          <a:fontRef idx="minor">
+            <a:schemeClr val="tx1"/>
+          </a:fontRef>
+        </p:style>
+      </p:cxnSp>
+      <p:sp>
+        <p:nvSpPr>
+          <p:cNvPr id="13" name="矩形: 圆角 12">
+            <a:extLst>
+              <a:ext uri="{FF2B5EF4-FFF2-40B4-BE49-F238E27FC236}">
+                <a16:creationId xmlns:a16="http://schemas.microsoft.com/office/drawing/2014/main" id="{764844CE-C239-3027-B953-B67CC7D70453}"/>
+              </a:ext>
+            </a:extLst>
+          </p:cNvPr>
+          <p:cNvSpPr/>
+          <p:nvPr/>
+        </p:nvSpPr>
+        <p:spPr>
+          <a:xfrm>
+            <a:off x="1982599" y="4653792"/>
+            <a:ext cx="1940653" cy="553674"/>
+          </a:xfrm>
+          <a:prstGeom prst="roundRect">
+            <a:avLst/>
+          </a:prstGeom>
+        </p:spPr>
+        <p:style>
+          <a:lnRef idx="1">
+            <a:schemeClr val="accent2"/>
+          </a:lnRef>
+          <a:fillRef idx="2">
+            <a:schemeClr val="accent2"/>
+          </a:fillRef>
+          <a:effectRef idx="1">
+            <a:schemeClr val="accent2"/>
+          </a:effectRef>
+          <a:fontRef idx="minor">
+            <a:schemeClr val="dk1"/>
+          </a:fontRef>
+        </p:style>
+        <p:txBody>
+          <a:bodyPr rtlCol="0" anchor="ctr"/>
+          <a:lstStyle/>
+          <a:p>
+            <a:pPr algn="ctr"/>
+            <a:r>
+              <a:rPr lang="en-US" altLang="zh-CN" dirty="0"/>
+              <a:t>xlsx</a:t>
+            </a:r>
+            <a:r>
+              <a:rPr lang="zh-CN" altLang="en-US" dirty="0"/>
+              <a:t>导入模板</a:t>
+            </a:r>
+          </a:p>
+        </p:txBody>
+      </p:sp>
+      <p:sp>
+        <p:nvSpPr>
+          <p:cNvPr id="20" name="矩形: 圆角 19">
+            <a:extLst>
+              <a:ext uri="{FF2B5EF4-FFF2-40B4-BE49-F238E27FC236}">
+                <a16:creationId xmlns:a16="http://schemas.microsoft.com/office/drawing/2014/main" id="{E009DF0B-C7E1-D438-4944-59DBEA80FAA7}"/>
+              </a:ext>
+            </a:extLst>
+          </p:cNvPr>
+          <p:cNvSpPr/>
+          <p:nvPr/>
+        </p:nvSpPr>
+        <p:spPr>
+          <a:xfrm>
+            <a:off x="4208615" y="4019374"/>
+            <a:ext cx="1940653" cy="553674"/>
+          </a:xfrm>
+          <a:prstGeom prst="roundRect">
+            <a:avLst/>
+          </a:prstGeom>
+        </p:spPr>
+        <p:style>
+          <a:lnRef idx="3">
+            <a:schemeClr val="lt1"/>
+          </a:lnRef>
+          <a:fillRef idx="1">
+            <a:schemeClr val="accent6"/>
+          </a:fillRef>
+          <a:effectRef idx="1">
+            <a:schemeClr val="accent6"/>
+          </a:effectRef>
+          <a:fontRef idx="minor">
+            <a:schemeClr val="lt1"/>
+          </a:fontRef>
+        </p:style>
+        <p:txBody>
+          <a:bodyPr rtlCol="0" anchor="ctr"/>
+          <a:lstStyle/>
+          <a:p>
+            <a:pPr algn="ctr"/>
+            <a:r>
+              <a:rPr lang="en-US" altLang="zh-CN" dirty="0" err="1"/>
+              <a:t>ReportModel</a:t>
+            </a:r>
+            <a:endParaRPr lang="zh-CN" altLang="en-US" dirty="0"/>
+          </a:p>
+        </p:txBody>
+      </p:sp>
+      <p:sp>
+        <p:nvSpPr>
+          <p:cNvPr id="21" name="矩形: 圆角 20">
+            <a:extLst>
+              <a:ext uri="{FF2B5EF4-FFF2-40B4-BE49-F238E27FC236}">
+                <a16:creationId xmlns:a16="http://schemas.microsoft.com/office/drawing/2014/main" id="{CB9408AC-B978-BBD3-6DF3-0BF009A99863}"/>
+              </a:ext>
+            </a:extLst>
+          </p:cNvPr>
+          <p:cNvSpPr/>
+          <p:nvPr/>
+        </p:nvSpPr>
+        <p:spPr>
+          <a:xfrm>
+            <a:off x="4208615" y="1922127"/>
+            <a:ext cx="1940653" cy="553674"/>
+          </a:xfrm>
+          <a:prstGeom prst="roundRect">
+            <a:avLst/>
+          </a:prstGeom>
+        </p:spPr>
+        <p:style>
+          <a:lnRef idx="2">
+            <a:schemeClr val="accent6">
+              <a:shade val="15000"/>
+            </a:schemeClr>
+          </a:lnRef>
+          <a:fillRef idx="1">
+            <a:schemeClr val="accent6"/>
+          </a:fillRef>
+          <a:effectRef idx="0">
+            <a:schemeClr val="accent6"/>
+          </a:effectRef>
+          <a:fontRef idx="minor">
+            <a:schemeClr val="lt1"/>
+          </a:fontRef>
+        </p:style>
+        <p:txBody>
+          <a:bodyPr rtlCol="0" anchor="ctr"/>
+          <a:lstStyle/>
+          <a:p>
+            <a:pPr algn="ctr"/>
+            <a:r>
+              <a:rPr lang="en-US" altLang="zh-CN" dirty="0" err="1"/>
+              <a:t>ImportModel</a:t>
+            </a:r>
+            <a:endParaRPr lang="zh-CN" altLang="en-US" dirty="0"/>
+          </a:p>
+        </p:txBody>
+      </p:sp>
+      <p:cxnSp>
+        <p:nvCxnSpPr>
+          <p:cNvPr id="23" name="直接箭头连接符 22">
+            <a:extLst>
+              <a:ext uri="{FF2B5EF4-FFF2-40B4-BE49-F238E27FC236}">
+                <a16:creationId xmlns:a16="http://schemas.microsoft.com/office/drawing/2014/main" id="{F3837083-D409-8EA0-17E2-09776D4AE63D}"/>
+              </a:ext>
+            </a:extLst>
+          </p:cNvPr>
+          <p:cNvCxnSpPr/>
+          <p:nvPr/>
+        </p:nvCxnSpPr>
+        <p:spPr>
+          <a:xfrm>
+            <a:off x="5116163" y="1400961"/>
+            <a:ext cx="0" cy="369116"/>
+          </a:xfrm>
+          <a:prstGeom prst="straightConnector1">
+            <a:avLst/>
+          </a:prstGeom>
+          <a:ln>
+            <a:tailEnd type="triangle"/>
+          </a:ln>
+        </p:spPr>
+        <p:style>
+          <a:lnRef idx="1">
+            <a:schemeClr val="accent1"/>
+          </a:lnRef>
+          <a:fillRef idx="0">
+            <a:schemeClr val="accent1"/>
+          </a:fillRef>
+          <a:effectRef idx="0">
+            <a:schemeClr val="accent1"/>
+          </a:effectRef>
+          <a:fontRef idx="minor">
+            <a:schemeClr val="tx1"/>
+          </a:fontRef>
+        </p:style>
+      </p:cxnSp>
+      <p:cxnSp>
+        <p:nvCxnSpPr>
+          <p:cNvPr id="25" name="直接箭头连接符 24">
+            <a:extLst>
+              <a:ext uri="{FF2B5EF4-FFF2-40B4-BE49-F238E27FC236}">
+                <a16:creationId xmlns:a16="http://schemas.microsoft.com/office/drawing/2014/main" id="{CE26AD4C-0DF8-CEBE-94F3-2B98593AEE95}"/>
+              </a:ext>
+            </a:extLst>
+          </p:cNvPr>
+          <p:cNvCxnSpPr>
+            <a:cxnSpLocks/>
+            <a:stCxn id="11" idx="0"/>
+          </p:cNvCxnSpPr>
+          <p:nvPr/>
+        </p:nvCxnSpPr>
+        <p:spPr>
+          <a:xfrm flipV="1">
+            <a:off x="5116163" y="4653792"/>
+            <a:ext cx="0" cy="425742"/>
+          </a:xfrm>
+          <a:prstGeom prst="straightConnector1">
+            <a:avLst/>
+          </a:prstGeom>
+          <a:ln>
+            <a:tailEnd type="triangle"/>
+          </a:ln>
+        </p:spPr>
+        <p:style>
+          <a:lnRef idx="1">
+            <a:schemeClr val="accent1"/>
+          </a:lnRef>
+          <a:fillRef idx="0">
+            <a:schemeClr val="accent1"/>
+          </a:fillRef>
+          <a:effectRef idx="0">
+            <a:schemeClr val="accent1"/>
+          </a:effectRef>
+          <a:fontRef idx="minor">
+            <a:schemeClr val="tx1"/>
+          </a:fontRef>
+        </p:style>
+      </p:cxnSp>
+      <p:sp>
+        <p:nvSpPr>
+          <p:cNvPr id="26" name="矩形: 圆角 25">
+            <a:extLst>
+              <a:ext uri="{FF2B5EF4-FFF2-40B4-BE49-F238E27FC236}">
+                <a16:creationId xmlns:a16="http://schemas.microsoft.com/office/drawing/2014/main" id="{7667B895-AE71-35A5-382B-9DC1410F0FE7}"/>
+              </a:ext>
+            </a:extLst>
+          </p:cNvPr>
+          <p:cNvSpPr/>
+          <p:nvPr/>
+        </p:nvSpPr>
+        <p:spPr>
+          <a:xfrm>
+            <a:off x="6651349" y="4653792"/>
+            <a:ext cx="1940653" cy="553674"/>
+          </a:xfrm>
+          <a:prstGeom prst="roundRect">
+            <a:avLst/>
+          </a:prstGeom>
+        </p:spPr>
+        <p:style>
+          <a:lnRef idx="1">
+            <a:schemeClr val="accent2"/>
+          </a:lnRef>
+          <a:fillRef idx="2">
+            <a:schemeClr val="accent2"/>
+          </a:fillRef>
+          <a:effectRef idx="1">
+            <a:schemeClr val="accent2"/>
+          </a:effectRef>
+          <a:fontRef idx="minor">
+            <a:schemeClr val="dk1"/>
+          </a:fontRef>
+        </p:style>
+        <p:txBody>
+          <a:bodyPr rtlCol="0" anchor="ctr"/>
+          <a:lstStyle/>
+          <a:p>
+            <a:pPr algn="ctr"/>
+            <a:r>
+              <a:rPr lang="en-US" altLang="zh-CN" dirty="0"/>
+              <a:t>xlsx</a:t>
+            </a:r>
+            <a:r>
+              <a:rPr lang="zh-CN" altLang="en-US" dirty="0"/>
+              <a:t>报表模板</a:t>
+            </a:r>
+            <a:endParaRPr lang="en-US" altLang="zh-CN" dirty="0"/>
+          </a:p>
+        </p:txBody>
+      </p:sp>
+      <p:cxnSp>
+        <p:nvCxnSpPr>
+          <p:cNvPr id="29" name="直接箭头连接符 28">
+            <a:extLst>
+              <a:ext uri="{FF2B5EF4-FFF2-40B4-BE49-F238E27FC236}">
+                <a16:creationId xmlns:a16="http://schemas.microsoft.com/office/drawing/2014/main" id="{967DDB60-1D4F-D976-AF4D-DBA72DD61542}"/>
+              </a:ext>
+            </a:extLst>
+          </p:cNvPr>
+          <p:cNvCxnSpPr/>
+          <p:nvPr/>
+        </p:nvCxnSpPr>
+        <p:spPr>
+          <a:xfrm flipV="1">
+            <a:off x="3405930" y="4303553"/>
+            <a:ext cx="802685" cy="276837"/>
+          </a:xfrm>
+          <a:prstGeom prst="straightConnector1">
+            <a:avLst/>
+          </a:prstGeom>
+          <a:ln>
+            <a:tailEnd type="triangle"/>
+          </a:ln>
+        </p:spPr>
+        <p:style>
+          <a:lnRef idx="1">
+            <a:schemeClr val="accent1"/>
+          </a:lnRef>
+          <a:fillRef idx="0">
+            <a:schemeClr val="accent1"/>
+          </a:fillRef>
+          <a:effectRef idx="0">
+            <a:schemeClr val="accent1"/>
+          </a:effectRef>
+          <a:fontRef idx="minor">
+            <a:schemeClr val="tx1"/>
+          </a:fontRef>
+        </p:style>
+      </p:cxnSp>
+      <p:cxnSp>
+        <p:nvCxnSpPr>
+          <p:cNvPr id="31" name="直接箭头连接符 30">
+            <a:extLst>
+              <a:ext uri="{FF2B5EF4-FFF2-40B4-BE49-F238E27FC236}">
+                <a16:creationId xmlns:a16="http://schemas.microsoft.com/office/drawing/2014/main" id="{FD263286-6F2C-4FE8-5BC4-6174342B1CE5}"/>
+              </a:ext>
+            </a:extLst>
+          </p:cNvPr>
+          <p:cNvCxnSpPr>
+            <a:endCxn id="20" idx="3"/>
+          </p:cNvCxnSpPr>
+          <p:nvPr/>
+        </p:nvCxnSpPr>
+        <p:spPr>
+          <a:xfrm flipH="1" flipV="1">
+            <a:off x="6231622" y="4374858"/>
+            <a:ext cx="662730" cy="198190"/>
+          </a:xfrm>
+          <a:prstGeom prst="straightConnector1">
+            <a:avLst/>
+          </a:prstGeom>
+          <a:ln>
+            <a:tailEnd type="triangle"/>
+          </a:ln>
+        </p:spPr>
+        <p:style>
+          <a:lnRef idx="1">
+            <a:schemeClr val="accent1"/>
+          </a:lnRef>
+          <a:fillRef idx="0">
+            <a:schemeClr val="accent1"/>
+          </a:fillRef>
+          <a:effectRef idx="0">
+            <a:schemeClr val="accent1"/>
+          </a:effectRef>
+          <a:fontRef idx="minor">
+            <a:schemeClr val="tx1"/>
+          </a:fontRef>
+        </p:style>
+      </p:cxnSp>
+    </p:spTree>
+    <p:extLst>
+      <p:ext uri="{BB962C8B-B14F-4D97-AF65-F5344CB8AC3E}">
+        <p14:creationId xmlns:p14="http://schemas.microsoft.com/office/powerpoint/2010/main" val="4091706310"/>
+      </p:ext>
+    </p:extLst>
+  </p:cSld>
+  <p:clrMapOvr>
+    <a:masterClrMapping/>
+  </p:clrMapOvr>
+</p:sld>
+</file>
+
+<file path=ppt/slides/slide14.xml><?xml version="1.0" encoding="utf-8"?>
+<p:sld xmlns:a="http://schemas.openxmlformats.org/drawingml/2006/main" xmlns:r="http://schemas.openxmlformats.org/officeDocument/2006/relationships" xmlns:p="http://schemas.openxmlformats.org/presentationml/2006/main">
+  <p:cSld>
+    <p:spTree>
+      <p:nvGrpSpPr>
+        <p:cNvPr id="1" name=""/>
+        <p:cNvGrpSpPr/>
+        <p:nvPr/>
+      </p:nvGrpSpPr>
+      <p:grpSpPr>
+        <a:xfrm>
+          <a:off x="0" y="0"/>
+          <a:ext cx="0" cy="0"/>
+          <a:chOff x="0" y="0"/>
+          <a:chExt cx="0" cy="0"/>
+        </a:xfrm>
+      </p:grpSpPr>
+      <p:sp>
+        <p:nvSpPr>
+          <p:cNvPr id="27" name="矩形 26">
+            <a:extLst>
+              <a:ext uri="{FF2B5EF4-FFF2-40B4-BE49-F238E27FC236}">
+                <a16:creationId xmlns:a16="http://schemas.microsoft.com/office/drawing/2014/main" id="{7074129A-B339-0082-FEB3-31DE678FB0E5}"/>
+              </a:ext>
+            </a:extLst>
+          </p:cNvPr>
+          <p:cNvSpPr/>
+          <p:nvPr/>
+        </p:nvSpPr>
+        <p:spPr>
+          <a:xfrm>
+            <a:off x="1294331" y="3161844"/>
+            <a:ext cx="4801658" cy="2577941"/>
+          </a:xfrm>
+          <a:prstGeom prst="rect">
+            <a:avLst/>
+          </a:prstGeom>
+        </p:spPr>
+        <p:style>
+          <a:lnRef idx="1">
+            <a:schemeClr val="accent6"/>
+          </a:lnRef>
+          <a:fillRef idx="2">
+            <a:schemeClr val="accent6"/>
+          </a:fillRef>
+          <a:effectRef idx="1">
+            <a:schemeClr val="accent6"/>
+          </a:effectRef>
+          <a:fontRef idx="minor">
+            <a:schemeClr val="dk1"/>
+          </a:fontRef>
+        </p:style>
+        <p:txBody>
+          <a:bodyPr rtlCol="0" anchor="ctr"/>
+          <a:lstStyle/>
+          <a:p>
+            <a:pPr algn="ctr"/>
+            <a:endParaRPr lang="zh-CN" altLang="en-US" dirty="0"/>
+          </a:p>
+        </p:txBody>
+      </p:sp>
+      <p:sp>
+        <p:nvSpPr>
+          <p:cNvPr id="4" name="文本框 3">
+            <a:extLst>
+              <a:ext uri="{FF2B5EF4-FFF2-40B4-BE49-F238E27FC236}">
+                <a16:creationId xmlns:a16="http://schemas.microsoft.com/office/drawing/2014/main" id="{02F288EC-ED53-6349-15B9-49B31A237F63}"/>
+              </a:ext>
+            </a:extLst>
+          </p:cNvPr>
+          <p:cNvSpPr txBox="1"/>
+          <p:nvPr/>
+        </p:nvSpPr>
+        <p:spPr>
+          <a:xfrm>
+            <a:off x="8831861" y="892366"/>
+            <a:ext cx="1940653" cy="707886"/>
+          </a:xfrm>
+          <a:prstGeom prst="rect">
+            <a:avLst/>
+          </a:prstGeom>
+          <a:noFill/>
+        </p:spPr>
+        <p:txBody>
+          <a:bodyPr wrap="square" rtlCol="0">
+            <a:spAutoFit/>
+          </a:bodyPr>
+          <a:lstStyle/>
+          <a:p>
+            <a:r>
+              <a:rPr lang="en-US" altLang="zh-CN" sz="4000" b="1" dirty="0" err="1"/>
+              <a:t>XLang</a:t>
+            </a:r>
+            <a:endParaRPr lang="zh-CN" altLang="en-US" sz="4000" b="1" dirty="0"/>
+          </a:p>
+        </p:txBody>
+      </p:sp>
+      <p:sp>
+        <p:nvSpPr>
+          <p:cNvPr id="7" name="椭圆 6">
+            <a:extLst>
+              <a:ext uri="{FF2B5EF4-FFF2-40B4-BE49-F238E27FC236}">
+                <a16:creationId xmlns:a16="http://schemas.microsoft.com/office/drawing/2014/main" id="{83B52619-6DDA-8E91-04A9-C1B0BD216F37}"/>
+              </a:ext>
+            </a:extLst>
+          </p:cNvPr>
+          <p:cNvSpPr/>
+          <p:nvPr/>
+        </p:nvSpPr>
+        <p:spPr>
+          <a:xfrm>
+            <a:off x="6810416" y="4015659"/>
+            <a:ext cx="1509310" cy="892366"/>
+          </a:xfrm>
+          <a:prstGeom prst="ellipse">
+            <a:avLst/>
+          </a:prstGeom>
+        </p:spPr>
+        <p:style>
+          <a:lnRef idx="3">
+            <a:schemeClr val="lt1"/>
+          </a:lnRef>
+          <a:fillRef idx="1">
+            <a:schemeClr val="accent1"/>
+          </a:fillRef>
+          <a:effectRef idx="1">
+            <a:schemeClr val="accent1"/>
+          </a:effectRef>
+          <a:fontRef idx="minor">
+            <a:schemeClr val="lt1"/>
+          </a:fontRef>
+        </p:style>
+        <p:txBody>
+          <a:bodyPr rtlCol="0" anchor="ctr"/>
+          <a:lstStyle/>
+          <a:p>
+            <a:pPr algn="ctr"/>
+            <a:r>
+              <a:rPr lang="en-US" altLang="zh-CN" dirty="0" err="1"/>
+              <a:t>XDef</a:t>
+            </a:r>
+            <a:endParaRPr lang="zh-CN" altLang="en-US" dirty="0"/>
+          </a:p>
+        </p:txBody>
+      </p:sp>
+      <p:sp>
+        <p:nvSpPr>
+          <p:cNvPr id="10" name="椭圆 9">
+            <a:extLst>
+              <a:ext uri="{FF2B5EF4-FFF2-40B4-BE49-F238E27FC236}">
+                <a16:creationId xmlns:a16="http://schemas.microsoft.com/office/drawing/2014/main" id="{3DBFB6D2-FB41-9BA6-4B95-ADED08C60FB9}"/>
+              </a:ext>
+            </a:extLst>
+          </p:cNvPr>
+          <p:cNvSpPr/>
+          <p:nvPr/>
+        </p:nvSpPr>
+        <p:spPr>
+          <a:xfrm>
+            <a:off x="1633668" y="3501933"/>
+            <a:ext cx="1509310" cy="892366"/>
+          </a:xfrm>
+          <a:prstGeom prst="ellipse">
+            <a:avLst/>
+          </a:prstGeom>
+        </p:spPr>
+        <p:style>
+          <a:lnRef idx="1">
+            <a:schemeClr val="accent2"/>
+          </a:lnRef>
+          <a:fillRef idx="2">
+            <a:schemeClr val="accent2"/>
+          </a:fillRef>
+          <a:effectRef idx="1">
+            <a:schemeClr val="accent2"/>
+          </a:effectRef>
+          <a:fontRef idx="minor">
+            <a:schemeClr val="dk1"/>
+          </a:fontRef>
+        </p:style>
+        <p:txBody>
+          <a:bodyPr rtlCol="0" anchor="ctr"/>
+          <a:lstStyle/>
+          <a:p>
+            <a:pPr algn="ctr"/>
+            <a:r>
+              <a:rPr lang="en-US" altLang="zh-CN" dirty="0" err="1"/>
+              <a:t>Xpl</a:t>
+            </a:r>
+            <a:endParaRPr lang="en-US" altLang="zh-CN" dirty="0"/>
+          </a:p>
+        </p:txBody>
+      </p:sp>
+      <p:sp>
+        <p:nvSpPr>
+          <p:cNvPr id="14" name="椭圆 13">
+            <a:extLst>
+              <a:ext uri="{FF2B5EF4-FFF2-40B4-BE49-F238E27FC236}">
+                <a16:creationId xmlns:a16="http://schemas.microsoft.com/office/drawing/2014/main" id="{0476180F-6D92-039E-DF95-A68CBA212B02}"/>
+              </a:ext>
+            </a:extLst>
+          </p:cNvPr>
+          <p:cNvSpPr/>
+          <p:nvPr/>
+        </p:nvSpPr>
+        <p:spPr>
+          <a:xfrm>
+            <a:off x="1593623" y="1751682"/>
+            <a:ext cx="1509310" cy="892366"/>
+          </a:xfrm>
+          <a:prstGeom prst="ellipse">
+            <a:avLst/>
+          </a:prstGeom>
+        </p:spPr>
+        <p:style>
+          <a:lnRef idx="1">
+            <a:schemeClr val="accent2"/>
+          </a:lnRef>
+          <a:fillRef idx="2">
+            <a:schemeClr val="accent2"/>
+          </a:fillRef>
+          <a:effectRef idx="1">
+            <a:schemeClr val="accent2"/>
+          </a:effectRef>
+          <a:fontRef idx="minor">
+            <a:schemeClr val="dk1"/>
+          </a:fontRef>
+        </p:style>
+        <p:txBody>
+          <a:bodyPr rtlCol="0" anchor="ctr"/>
+          <a:lstStyle/>
+          <a:p>
+            <a:pPr algn="ctr"/>
+            <a:r>
+              <a:rPr lang="en-US" altLang="zh-CN" dirty="0" err="1"/>
+              <a:t>XScript</a:t>
+            </a:r>
+            <a:endParaRPr lang="en-US" altLang="zh-CN" dirty="0"/>
+          </a:p>
+        </p:txBody>
+      </p:sp>
+      <p:sp>
+        <p:nvSpPr>
+          <p:cNvPr id="15" name="椭圆 14">
+            <a:extLst>
+              <a:ext uri="{FF2B5EF4-FFF2-40B4-BE49-F238E27FC236}">
+                <a16:creationId xmlns:a16="http://schemas.microsoft.com/office/drawing/2014/main" id="{CDEE046E-D8F1-5863-7591-CF8C56CF7AFF}"/>
+              </a:ext>
+            </a:extLst>
+          </p:cNvPr>
+          <p:cNvSpPr/>
+          <p:nvPr/>
+        </p:nvSpPr>
+        <p:spPr>
+          <a:xfrm>
+            <a:off x="3770450" y="3481339"/>
+            <a:ext cx="1509310" cy="892366"/>
+          </a:xfrm>
+          <a:prstGeom prst="ellipse">
+            <a:avLst/>
+          </a:prstGeom>
+        </p:spPr>
+        <p:style>
+          <a:lnRef idx="1">
+            <a:schemeClr val="accent2"/>
+          </a:lnRef>
+          <a:fillRef idx="2">
+            <a:schemeClr val="accent2"/>
+          </a:fillRef>
+          <a:effectRef idx="1">
+            <a:schemeClr val="accent2"/>
+          </a:effectRef>
+          <a:fontRef idx="minor">
+            <a:schemeClr val="dk1"/>
+          </a:fontRef>
+        </p:style>
+        <p:txBody>
+          <a:bodyPr rtlCol="0" anchor="ctr"/>
+          <a:lstStyle/>
+          <a:p>
+            <a:pPr algn="ctr"/>
+            <a:r>
+              <a:rPr lang="en-US" altLang="zh-CN" dirty="0" err="1"/>
+              <a:t>Xlib</a:t>
+            </a:r>
+            <a:endParaRPr lang="en-US" altLang="zh-CN" dirty="0"/>
+          </a:p>
+        </p:txBody>
+      </p:sp>
+      <p:sp>
+        <p:nvSpPr>
+          <p:cNvPr id="16" name="椭圆 15">
+            <a:extLst>
+              <a:ext uri="{FF2B5EF4-FFF2-40B4-BE49-F238E27FC236}">
+                <a16:creationId xmlns:a16="http://schemas.microsoft.com/office/drawing/2014/main" id="{30736D9B-9009-EB4C-5CE2-48F8B2CD2875}"/>
+              </a:ext>
+            </a:extLst>
+          </p:cNvPr>
+          <p:cNvSpPr/>
+          <p:nvPr/>
+        </p:nvSpPr>
+        <p:spPr>
+          <a:xfrm>
+            <a:off x="4144330" y="1751682"/>
+            <a:ext cx="1509310" cy="892366"/>
+          </a:xfrm>
+          <a:prstGeom prst="ellipse">
+            <a:avLst/>
+          </a:prstGeom>
+        </p:spPr>
+        <p:style>
+          <a:lnRef idx="1">
+            <a:schemeClr val="accent4"/>
+          </a:lnRef>
+          <a:fillRef idx="2">
+            <a:schemeClr val="accent4"/>
+          </a:fillRef>
+          <a:effectRef idx="1">
+            <a:schemeClr val="accent4"/>
+          </a:effectRef>
+          <a:fontRef idx="minor">
+            <a:schemeClr val="dk1"/>
+          </a:fontRef>
+        </p:style>
+        <p:txBody>
+          <a:bodyPr rtlCol="0" anchor="ctr"/>
+          <a:lstStyle/>
+          <a:p>
+            <a:pPr algn="ctr"/>
+            <a:r>
+              <a:rPr lang="en-US" altLang="zh-CN" dirty="0" err="1"/>
+              <a:t>antlr</a:t>
+            </a:r>
+            <a:endParaRPr lang="en-US" altLang="zh-CN" dirty="0"/>
+          </a:p>
+        </p:txBody>
+      </p:sp>
+      <p:cxnSp>
+        <p:nvCxnSpPr>
+          <p:cNvPr id="19" name="直接箭头连接符 18">
+            <a:extLst>
+              <a:ext uri="{FF2B5EF4-FFF2-40B4-BE49-F238E27FC236}">
+                <a16:creationId xmlns:a16="http://schemas.microsoft.com/office/drawing/2014/main" id="{C2A14BD6-AB84-44DA-05E4-A5422C2154B8}"/>
+              </a:ext>
+            </a:extLst>
+          </p:cNvPr>
+          <p:cNvCxnSpPr>
+            <a:cxnSpLocks/>
+          </p:cNvCxnSpPr>
+          <p:nvPr/>
+        </p:nvCxnSpPr>
+        <p:spPr>
+          <a:xfrm flipV="1">
+            <a:off x="2348278" y="2800411"/>
+            <a:ext cx="0" cy="617572"/>
+          </a:xfrm>
+          <a:prstGeom prst="straightConnector1">
+            <a:avLst/>
+          </a:prstGeom>
+          <a:ln>
+            <a:tailEnd type="triangle"/>
+          </a:ln>
+        </p:spPr>
+        <p:style>
+          <a:lnRef idx="1">
+            <a:schemeClr val="accent1"/>
+          </a:lnRef>
+          <a:fillRef idx="0">
+            <a:schemeClr val="accent1"/>
+          </a:fillRef>
+          <a:effectRef idx="0">
+            <a:schemeClr val="accent1"/>
+          </a:effectRef>
+          <a:fontRef idx="minor">
+            <a:schemeClr val="tx1"/>
+          </a:fontRef>
+        </p:style>
+      </p:cxnSp>
+      <p:cxnSp>
+        <p:nvCxnSpPr>
+          <p:cNvPr id="24" name="直接箭头连接符 23">
+            <a:extLst>
+              <a:ext uri="{FF2B5EF4-FFF2-40B4-BE49-F238E27FC236}">
+                <a16:creationId xmlns:a16="http://schemas.microsoft.com/office/drawing/2014/main" id="{46A7CECD-7E89-06BF-40CE-21579D35CB93}"/>
+              </a:ext>
+            </a:extLst>
+          </p:cNvPr>
+          <p:cNvCxnSpPr>
+            <a:endCxn id="16" idx="2"/>
+          </p:cNvCxnSpPr>
+          <p:nvPr/>
+        </p:nvCxnSpPr>
+        <p:spPr>
+          <a:xfrm>
+            <a:off x="3216926" y="2197865"/>
+            <a:ext cx="927404" cy="0"/>
+          </a:xfrm>
+          <a:prstGeom prst="straightConnector1">
+            <a:avLst/>
+          </a:prstGeom>
+          <a:ln>
+            <a:tailEnd type="triangle"/>
+          </a:ln>
+        </p:spPr>
+        <p:style>
+          <a:lnRef idx="1">
+            <a:schemeClr val="accent1"/>
+          </a:lnRef>
+          <a:fillRef idx="0">
+            <a:schemeClr val="accent1"/>
+          </a:fillRef>
+          <a:effectRef idx="0">
+            <a:schemeClr val="accent1"/>
+          </a:effectRef>
+          <a:fontRef idx="minor">
+            <a:schemeClr val="tx1"/>
+          </a:fontRef>
+        </p:style>
+      </p:cxnSp>
+      <p:sp>
+        <p:nvSpPr>
+          <p:cNvPr id="28" name="文本框 27">
+            <a:extLst>
+              <a:ext uri="{FF2B5EF4-FFF2-40B4-BE49-F238E27FC236}">
+                <a16:creationId xmlns:a16="http://schemas.microsoft.com/office/drawing/2014/main" id="{E3F73F58-8F85-00D5-1D35-8C0694B0A70E}"/>
+              </a:ext>
+            </a:extLst>
+          </p:cNvPr>
+          <p:cNvSpPr txBox="1"/>
+          <p:nvPr/>
+        </p:nvSpPr>
+        <p:spPr>
+          <a:xfrm>
+            <a:off x="5177358" y="3224928"/>
+            <a:ext cx="786021" cy="369332"/>
+          </a:xfrm>
+          <a:prstGeom prst="rect">
+            <a:avLst/>
+          </a:prstGeom>
+          <a:noFill/>
+        </p:spPr>
+        <p:txBody>
+          <a:bodyPr wrap="square" rtlCol="0">
+            <a:spAutoFit/>
+          </a:bodyPr>
+          <a:lstStyle/>
+          <a:p>
+            <a:r>
+              <a:rPr lang="en-US" altLang="zh-CN" b="1" dirty="0"/>
+              <a:t>XDSL</a:t>
+            </a:r>
+            <a:endParaRPr lang="zh-CN" altLang="en-US" b="1" dirty="0"/>
+          </a:p>
+        </p:txBody>
+      </p:sp>
+      <p:sp>
+        <p:nvSpPr>
+          <p:cNvPr id="30" name="椭圆 29">
+            <a:extLst>
+              <a:ext uri="{FF2B5EF4-FFF2-40B4-BE49-F238E27FC236}">
+                <a16:creationId xmlns:a16="http://schemas.microsoft.com/office/drawing/2014/main" id="{A6A232BA-0F83-AF4E-BFB5-DD8D4A146DD6}"/>
+              </a:ext>
+            </a:extLst>
+          </p:cNvPr>
+          <p:cNvSpPr/>
+          <p:nvPr/>
+        </p:nvSpPr>
+        <p:spPr>
+          <a:xfrm>
+            <a:off x="2445598" y="4734370"/>
+            <a:ext cx="1999713" cy="892366"/>
+          </a:xfrm>
+          <a:prstGeom prst="ellipse">
+            <a:avLst/>
+          </a:prstGeom>
+        </p:spPr>
+        <p:style>
+          <a:lnRef idx="1">
+            <a:schemeClr val="accent2"/>
+          </a:lnRef>
+          <a:fillRef idx="2">
+            <a:schemeClr val="accent2"/>
+          </a:fillRef>
+          <a:effectRef idx="1">
+            <a:schemeClr val="accent2"/>
+          </a:effectRef>
+          <a:fontRef idx="minor">
+            <a:schemeClr val="dk1"/>
+          </a:fontRef>
+        </p:style>
+        <p:txBody>
+          <a:bodyPr rtlCol="0" anchor="ctr"/>
+          <a:lstStyle/>
+          <a:p>
+            <a:pPr algn="ctr"/>
+            <a:r>
+              <a:rPr lang="en-US" altLang="zh-CN" dirty="0" err="1"/>
+              <a:t>XTransform</a:t>
+            </a:r>
+            <a:endParaRPr lang="en-US" altLang="zh-CN" dirty="0"/>
+          </a:p>
+        </p:txBody>
+      </p:sp>
+      <p:sp>
+        <p:nvSpPr>
+          <p:cNvPr id="32" name="椭圆 31">
+            <a:extLst>
+              <a:ext uri="{FF2B5EF4-FFF2-40B4-BE49-F238E27FC236}">
+                <a16:creationId xmlns:a16="http://schemas.microsoft.com/office/drawing/2014/main" id="{7EFE3FD5-E8F9-088A-A016-6554CC853D61}"/>
+              </a:ext>
+            </a:extLst>
+          </p:cNvPr>
+          <p:cNvSpPr/>
+          <p:nvPr/>
+        </p:nvSpPr>
+        <p:spPr>
+          <a:xfrm>
+            <a:off x="6810416" y="1751682"/>
+            <a:ext cx="1509310" cy="892366"/>
+          </a:xfrm>
+          <a:prstGeom prst="ellipse">
+            <a:avLst/>
+          </a:prstGeom>
+        </p:spPr>
+        <p:style>
+          <a:lnRef idx="1">
+            <a:schemeClr val="accent2"/>
+          </a:lnRef>
+          <a:fillRef idx="2">
+            <a:schemeClr val="accent2"/>
+          </a:fillRef>
+          <a:effectRef idx="1">
+            <a:schemeClr val="accent2"/>
+          </a:effectRef>
+          <a:fontRef idx="minor">
+            <a:schemeClr val="dk1"/>
+          </a:fontRef>
+        </p:style>
+        <p:txBody>
+          <a:bodyPr rtlCol="0" anchor="ctr"/>
+          <a:lstStyle/>
+          <a:p>
+            <a:pPr algn="ctr"/>
+            <a:r>
+              <a:rPr lang="en-US" altLang="zh-CN" dirty="0"/>
+              <a:t>XPath</a:t>
+            </a:r>
+          </a:p>
+        </p:txBody>
+      </p:sp>
+      <p:sp>
+        <p:nvSpPr>
+          <p:cNvPr id="33" name="椭圆 32">
+            <a:extLst>
+              <a:ext uri="{FF2B5EF4-FFF2-40B4-BE49-F238E27FC236}">
+                <a16:creationId xmlns:a16="http://schemas.microsoft.com/office/drawing/2014/main" id="{CBFE7AB9-EEBF-F18E-8505-B0804168CC16}"/>
+              </a:ext>
+            </a:extLst>
+          </p:cNvPr>
+          <p:cNvSpPr/>
+          <p:nvPr/>
+        </p:nvSpPr>
+        <p:spPr>
+          <a:xfrm>
+            <a:off x="8929026" y="3993363"/>
+            <a:ext cx="1587811" cy="892366"/>
+          </a:xfrm>
+          <a:prstGeom prst="ellipse">
+            <a:avLst/>
+          </a:prstGeom>
+        </p:spPr>
+        <p:style>
+          <a:lnRef idx="3">
+            <a:schemeClr val="lt1"/>
+          </a:lnRef>
+          <a:fillRef idx="1">
+            <a:schemeClr val="accent1"/>
+          </a:fillRef>
+          <a:effectRef idx="1">
+            <a:schemeClr val="accent1"/>
+          </a:effectRef>
+          <a:fontRef idx="minor">
+            <a:schemeClr val="lt1"/>
+          </a:fontRef>
+        </p:style>
+        <p:txBody>
+          <a:bodyPr rtlCol="0" anchor="ctr"/>
+          <a:lstStyle/>
+          <a:p>
+            <a:pPr algn="ctr"/>
+            <a:r>
+              <a:rPr lang="en-US" altLang="zh-CN" dirty="0" err="1"/>
+              <a:t>xdef.xdef</a:t>
+            </a:r>
+            <a:endParaRPr lang="zh-CN" altLang="en-US" dirty="0"/>
+          </a:p>
+        </p:txBody>
+      </p:sp>
+      <p:cxnSp>
+        <p:nvCxnSpPr>
+          <p:cNvPr id="35" name="直接箭头连接符 34">
+            <a:extLst>
+              <a:ext uri="{FF2B5EF4-FFF2-40B4-BE49-F238E27FC236}">
+                <a16:creationId xmlns:a16="http://schemas.microsoft.com/office/drawing/2014/main" id="{64881B02-C2A1-6CD7-C642-E77DB54F7749}"/>
+              </a:ext>
+            </a:extLst>
+          </p:cNvPr>
+          <p:cNvCxnSpPr>
+            <a:cxnSpLocks/>
+          </p:cNvCxnSpPr>
+          <p:nvPr/>
+        </p:nvCxnSpPr>
+        <p:spPr>
+          <a:xfrm>
+            <a:off x="3222821" y="3948116"/>
+            <a:ext cx="445265" cy="0"/>
+          </a:xfrm>
+          <a:prstGeom prst="straightConnector1">
+            <a:avLst/>
+          </a:prstGeom>
+          <a:ln>
+            <a:tailEnd type="triangle"/>
+          </a:ln>
+        </p:spPr>
+        <p:style>
+          <a:lnRef idx="1">
+            <a:schemeClr val="accent1"/>
+          </a:lnRef>
+          <a:fillRef idx="0">
+            <a:schemeClr val="accent1"/>
+          </a:fillRef>
+          <a:effectRef idx="0">
+            <a:schemeClr val="accent1"/>
+          </a:effectRef>
+          <a:fontRef idx="minor">
+            <a:schemeClr val="tx1"/>
+          </a:fontRef>
+        </p:style>
+      </p:cxnSp>
+      <p:cxnSp>
+        <p:nvCxnSpPr>
+          <p:cNvPr id="37" name="直接箭头连接符 36">
+            <a:extLst>
+              <a:ext uri="{FF2B5EF4-FFF2-40B4-BE49-F238E27FC236}">
+                <a16:creationId xmlns:a16="http://schemas.microsoft.com/office/drawing/2014/main" id="{238AC13A-CD0F-1633-5C54-2F28AA400F23}"/>
+              </a:ext>
+            </a:extLst>
+          </p:cNvPr>
+          <p:cNvCxnSpPr>
+            <a:stCxn id="7" idx="2"/>
+          </p:cNvCxnSpPr>
+          <p:nvPr/>
+        </p:nvCxnSpPr>
+        <p:spPr>
+          <a:xfrm flipH="1">
+            <a:off x="6136400" y="4461842"/>
+            <a:ext cx="674016" cy="0"/>
+          </a:xfrm>
+          <a:prstGeom prst="straightConnector1">
+            <a:avLst/>
+          </a:prstGeom>
+          <a:ln>
+            <a:tailEnd type="triangle"/>
+          </a:ln>
+        </p:spPr>
+        <p:style>
+          <a:lnRef idx="1">
+            <a:schemeClr val="accent1"/>
+          </a:lnRef>
+          <a:fillRef idx="0">
+            <a:schemeClr val="accent1"/>
+          </a:fillRef>
+          <a:effectRef idx="0">
+            <a:schemeClr val="accent1"/>
+          </a:effectRef>
+          <a:fontRef idx="minor">
+            <a:schemeClr val="tx1"/>
+          </a:fontRef>
+        </p:style>
+      </p:cxnSp>
+      <p:cxnSp>
+        <p:nvCxnSpPr>
+          <p:cNvPr id="39" name="直接箭头连接符 38">
+            <a:extLst>
+              <a:ext uri="{FF2B5EF4-FFF2-40B4-BE49-F238E27FC236}">
+                <a16:creationId xmlns:a16="http://schemas.microsoft.com/office/drawing/2014/main" id="{3B95DD5D-2293-4086-13C6-56DFEA92C3B3}"/>
+              </a:ext>
+            </a:extLst>
+          </p:cNvPr>
+          <p:cNvCxnSpPr>
+            <a:cxnSpLocks/>
+          </p:cNvCxnSpPr>
+          <p:nvPr/>
+        </p:nvCxnSpPr>
+        <p:spPr>
+          <a:xfrm flipH="1">
+            <a:off x="8319726" y="4439546"/>
+            <a:ext cx="512135" cy="0"/>
+          </a:xfrm>
+          <a:prstGeom prst="straightConnector1">
+            <a:avLst/>
+          </a:prstGeom>
+          <a:ln>
+            <a:tailEnd type="triangle"/>
+          </a:ln>
+        </p:spPr>
+        <p:style>
+          <a:lnRef idx="1">
+            <a:schemeClr val="accent1"/>
+          </a:lnRef>
+          <a:fillRef idx="0">
+            <a:schemeClr val="accent1"/>
+          </a:fillRef>
+          <a:effectRef idx="0">
+            <a:schemeClr val="accent1"/>
+          </a:effectRef>
+          <a:fontRef idx="minor">
+            <a:schemeClr val="tx1"/>
+          </a:fontRef>
+        </p:style>
+      </p:cxnSp>
+    </p:spTree>
+    <p:extLst>
+      <p:ext uri="{BB962C8B-B14F-4D97-AF65-F5344CB8AC3E}">
+        <p14:creationId xmlns:p14="http://schemas.microsoft.com/office/powerpoint/2010/main" val="3210405092"/>
+      </p:ext>
+    </p:extLst>
+  </p:cSld>
+  <p:clrMapOvr>
+    <a:masterClrMapping/>
+  </p:clrMapOvr>
+</p:sld>
+</file>
+
 <file path=ppt/slides/slide2.xml><?xml version="1.0" encoding="utf-8"?>
 <p:sld xmlns:a="http://schemas.openxmlformats.org/drawingml/2006/main" xmlns:r="http://schemas.openxmlformats.org/officeDocument/2006/relationships" xmlns:p="http://schemas.openxmlformats.org/presentationml/2006/main">
   <p:cSld>

</xml_diff>